<commit_message>
Retrieving Data From Database Table
</commit_message>
<xml_diff>
--- a/.lessons/16 Fundamental. Database - Query Builder/2 Retrieving Data From Database Table/1.pptx
+++ b/.lessons/16 Fundamental. Database - Query Builder/2 Retrieving Data From Database Table/1.pptx
@@ -10,6 +10,12 @@
     <p:sldId id="398" r:id="rId4"/>
     <p:sldId id="399" r:id="rId5"/>
     <p:sldId id="400" r:id="rId6"/>
+    <p:sldId id="403" r:id="rId7"/>
+    <p:sldId id="404" r:id="rId8"/>
+    <p:sldId id="401" r:id="rId9"/>
+    <p:sldId id="402" r:id="rId10"/>
+    <p:sldId id="405" r:id="rId11"/>
+    <p:sldId id="406" r:id="rId12"/>
   </p:sldIdLst>
   <p:sldSz cx="12192000" cy="6858000"/>
   <p:notesSz cx="6858000" cy="9144000"/>
@@ -3350,6 +3356,1114 @@
         </p:nvSpPr>
         <p:spPr>
           <a:xfrm>
+            <a:off x="217715" y="255046"/>
+            <a:ext cx="4571102" cy="4885376"/>
+          </a:xfrm>
+          <a:prstGeom prst="rect">
+            <a:avLst/>
+          </a:prstGeom>
+          <a:noFill/>
+        </p:spPr>
+        <p:txBody>
+          <a:bodyPr wrap="square">
+            <a:spAutoFit/>
+          </a:bodyPr>
+          <a:lstStyle/>
+          <a:p>
+            <a:pPr algn="just">
+              <a:lnSpc>
+                <a:spcPct val="150000"/>
+              </a:lnSpc>
+              <a:buNone/>
+            </a:pPr>
+            <a:r>
+              <a:rPr kumimoji="0" lang="az-Latn-AZ" altLang="en-US" sz="1100" b="0" i="0" u="none" strike="noStrike" cap="none" normalizeH="0" baseline="0">
+                <a:ln>
+                  <a:noFill/>
+                </a:ln>
+                <a:solidFill>
+                  <a:schemeClr val="tx1"/>
+                </a:solidFill>
+                <a:effectLst/>
+                <a:latin typeface="Arial" panose="020B0604020202020204" pitchFamily="34" charset="0"/>
+              </a:rPr>
+              <a:t>İ</a:t>
+            </a:r>
+            <a:r>
+              <a:rPr kumimoji="0" lang="en-US" altLang="en-US" sz="1100" b="0" i="0" u="none" strike="noStrike" cap="none" normalizeH="0" baseline="0">
+                <a:ln>
+                  <a:noFill/>
+                </a:ln>
+                <a:solidFill>
+                  <a:schemeClr val="tx1"/>
+                </a:solidFill>
+                <a:effectLst/>
+                <a:latin typeface="Arial" panose="020B0604020202020204" pitchFamily="34" charset="0"/>
+              </a:rPr>
+              <a:t>ndi </a:t>
+            </a:r>
+            <a:r>
+              <a:rPr kumimoji="0" lang="en-US" altLang="en-US" sz="1100" b="1" i="0" u="none" strike="noStrike" cap="none" normalizeH="0" baseline="0">
+                <a:ln>
+                  <a:noFill/>
+                </a:ln>
+                <a:solidFill>
+                  <a:srgbClr val="FF0000"/>
+                </a:solidFill>
+                <a:effectLst/>
+                <a:latin typeface="Arial" panose="020B0604020202020204" pitchFamily="34" charset="0"/>
+              </a:rPr>
+              <a:t>DB::table() </a:t>
+            </a:r>
+            <a:r>
+              <a:rPr kumimoji="0" lang="en-US" altLang="en-US" sz="1100" b="0" i="0" u="none" strike="noStrike" cap="none" normalizeH="0" baseline="0">
+                <a:ln>
+                  <a:noFill/>
+                </a:ln>
+                <a:solidFill>
+                  <a:schemeClr val="tx1"/>
+                </a:solidFill>
+                <a:effectLst/>
+                <a:latin typeface="Arial" panose="020B0604020202020204" pitchFamily="34" charset="0"/>
+              </a:rPr>
+              <a:t>və </a:t>
+            </a:r>
+            <a:r>
+              <a:rPr kumimoji="0" lang="en-US" altLang="en-US" sz="1100" b="1" i="0" u="none" strike="noStrike" cap="none" normalizeH="0" baseline="0">
+                <a:ln>
+                  <a:noFill/>
+                </a:ln>
+                <a:solidFill>
+                  <a:srgbClr val="0070C0"/>
+                </a:solidFill>
+                <a:effectLst/>
+                <a:latin typeface="Arial" panose="020B0604020202020204" pitchFamily="34" charset="0"/>
+              </a:rPr>
+              <a:t>-&gt;find()</a:t>
+            </a:r>
+            <a:r>
+              <a:rPr kumimoji="0" lang="en-US" altLang="en-US" sz="1100" b="1" i="0" u="none" strike="noStrike" cap="none" normalizeH="0" baseline="0">
+                <a:ln>
+                  <a:noFill/>
+                </a:ln>
+                <a:solidFill>
+                  <a:schemeClr val="tx1"/>
+                </a:solidFill>
+                <a:effectLst/>
+                <a:latin typeface="Arial" panose="020B0604020202020204" pitchFamily="34" charset="0"/>
+              </a:rPr>
+              <a:t>, </a:t>
+            </a:r>
+            <a:r>
+              <a:rPr kumimoji="0" lang="en-US" altLang="en-US" sz="1100" b="1" i="0" u="none" strike="noStrike" cap="none" normalizeH="0" baseline="0">
+                <a:ln>
+                  <a:noFill/>
+                </a:ln>
+                <a:solidFill>
+                  <a:srgbClr val="0070C0"/>
+                </a:solidFill>
+                <a:effectLst/>
+                <a:latin typeface="Arial" panose="020B0604020202020204" pitchFamily="34" charset="0"/>
+              </a:rPr>
+              <a:t>-&gt;get() </a:t>
+            </a:r>
+            <a:r>
+              <a:rPr kumimoji="0" lang="en-US" altLang="en-US" sz="1100" b="0" i="0" u="none" strike="noStrike" cap="none" normalizeH="0" baseline="0">
+                <a:ln>
+                  <a:noFill/>
+                </a:ln>
+                <a:solidFill>
+                  <a:schemeClr val="tx1"/>
+                </a:solidFill>
+                <a:effectLst/>
+                <a:latin typeface="Arial" panose="020B0604020202020204" pitchFamily="34" charset="0"/>
+              </a:rPr>
+              <a:t>kimi metodları</a:t>
+            </a:r>
+            <a:r>
+              <a:rPr kumimoji="0" lang="az-Latn-AZ" altLang="en-US" sz="1100" b="0" i="0" u="none" strike="noStrike" cap="none" normalizeH="0" baseline="0">
+                <a:ln>
+                  <a:noFill/>
+                </a:ln>
+                <a:solidFill>
+                  <a:schemeClr val="tx1"/>
+                </a:solidFill>
+                <a:effectLst/>
+                <a:latin typeface="Arial" panose="020B0604020202020204" pitchFamily="34" charset="0"/>
+              </a:rPr>
+              <a:t> incələyək.</a:t>
+            </a:r>
+          </a:p>
+          <a:p>
+            <a:pPr algn="just">
+              <a:lnSpc>
+                <a:spcPct val="150000"/>
+              </a:lnSpc>
+              <a:buNone/>
+            </a:pPr>
+            <a:endParaRPr lang="az-Latn-AZ" altLang="en-US" sz="1100">
+              <a:latin typeface="Arial" panose="020B0604020202020204" pitchFamily="34" charset="0"/>
+            </a:endParaRPr>
+          </a:p>
+          <a:p>
+            <a:pPr algn="just">
+              <a:lnSpc>
+                <a:spcPct val="150000"/>
+              </a:lnSpc>
+              <a:buNone/>
+            </a:pPr>
+            <a:r>
+              <a:rPr kumimoji="0" lang="en-US" altLang="en-US" sz="1100" b="1" i="0" u="none" strike="noStrike" cap="none" normalizeH="0" baseline="0">
+                <a:ln>
+                  <a:noFill/>
+                </a:ln>
+                <a:solidFill>
+                  <a:schemeClr val="tx1"/>
+                </a:solidFill>
+                <a:effectLst/>
+                <a:latin typeface="Arial" panose="020B0604020202020204" pitchFamily="34" charset="0"/>
+              </a:rPr>
+              <a:t>DB::table() </a:t>
+            </a:r>
+            <a:r>
+              <a:rPr kumimoji="0" lang="en-US" altLang="en-US" sz="1100" b="0" i="0" u="none" strike="noStrike" cap="none" normalizeH="0" baseline="0">
+                <a:ln>
+                  <a:noFill/>
+                </a:ln>
+                <a:solidFill>
+                  <a:schemeClr val="tx1"/>
+                </a:solidFill>
+                <a:effectLst/>
+                <a:latin typeface="Arial" panose="020B0604020202020204" pitchFamily="34" charset="0"/>
+              </a:rPr>
+              <a:t>nədir?</a:t>
+            </a:r>
+            <a:endParaRPr kumimoji="0" lang="az-Latn-AZ" altLang="en-US" sz="1100" b="0" i="0" u="none" strike="noStrike" cap="none" normalizeH="0" baseline="0">
+              <a:ln>
+                <a:noFill/>
+              </a:ln>
+              <a:solidFill>
+                <a:schemeClr val="tx1"/>
+              </a:solidFill>
+              <a:effectLst/>
+              <a:latin typeface="Arial" panose="020B0604020202020204" pitchFamily="34" charset="0"/>
+            </a:endParaRPr>
+          </a:p>
+          <a:p>
+            <a:pPr algn="just">
+              <a:lnSpc>
+                <a:spcPct val="150000"/>
+              </a:lnSpc>
+              <a:buNone/>
+            </a:pPr>
+            <a:endParaRPr kumimoji="0" lang="en-US" altLang="en-US" sz="1100" b="0" i="0" u="none" strike="noStrike" cap="none" normalizeH="0" baseline="0">
+              <a:ln>
+                <a:noFill/>
+              </a:ln>
+              <a:solidFill>
+                <a:schemeClr val="tx1"/>
+              </a:solidFill>
+              <a:effectLst/>
+              <a:latin typeface="Arial" panose="020B0604020202020204" pitchFamily="34" charset="0"/>
+            </a:endParaRPr>
+          </a:p>
+          <a:p>
+            <a:pPr algn="just">
+              <a:lnSpc>
+                <a:spcPct val="150000"/>
+              </a:lnSpc>
+              <a:buNone/>
+            </a:pPr>
+            <a:r>
+              <a:rPr kumimoji="0" lang="en-US" altLang="en-US" sz="1100" b="1" i="0" u="none" strike="noStrike" cap="none" normalizeH="0" baseline="0">
+                <a:ln>
+                  <a:noFill/>
+                </a:ln>
+                <a:solidFill>
+                  <a:srgbClr val="00B050"/>
+                </a:solidFill>
+                <a:effectLst/>
+                <a:latin typeface="Arial" panose="020B0604020202020204" pitchFamily="34" charset="0"/>
+              </a:rPr>
+              <a:t>DB::table('posts') </a:t>
+            </a:r>
+            <a:r>
+              <a:rPr kumimoji="0" lang="en-US" altLang="en-US" sz="1100" b="0" i="0" u="none" strike="noStrike" cap="none" normalizeH="0" baseline="0">
+                <a:ln>
+                  <a:noFill/>
+                </a:ln>
+                <a:solidFill>
+                  <a:schemeClr val="tx1"/>
+                </a:solidFill>
+                <a:effectLst/>
+                <a:latin typeface="Arial" panose="020B0604020202020204" pitchFamily="34" charset="0"/>
+              </a:rPr>
+              <a:t>Laravel-in </a:t>
+            </a:r>
+            <a:r>
+              <a:rPr kumimoji="0" lang="en-US" altLang="en-US" sz="1100" b="1" i="0" u="none" strike="noStrike" cap="none" normalizeH="0" baseline="0">
+                <a:ln>
+                  <a:noFill/>
+                </a:ln>
+                <a:solidFill>
+                  <a:schemeClr val="tx1"/>
+                </a:solidFill>
+                <a:effectLst/>
+                <a:latin typeface="Arial" panose="020B0604020202020204" pitchFamily="34" charset="0"/>
+              </a:rPr>
+              <a:t>Query Builder </a:t>
+            </a:r>
+            <a:r>
+              <a:rPr kumimoji="0" lang="en-US" altLang="en-US" sz="1100" b="0" i="0" u="none" strike="noStrike" cap="none" normalizeH="0" baseline="0">
+                <a:ln>
+                  <a:noFill/>
+                </a:ln>
+                <a:solidFill>
+                  <a:schemeClr val="tx1"/>
+                </a:solidFill>
+                <a:effectLst/>
+                <a:latin typeface="Arial" panose="020B0604020202020204" pitchFamily="34" charset="0"/>
+              </a:rPr>
+              <a:t>funksionallığından istifadə edərək verilənlər bazasındakı </a:t>
+            </a:r>
+            <a:r>
+              <a:rPr kumimoji="0" lang="en-US" altLang="en-US" sz="1100" b="1" i="0" u="none" strike="noStrike" cap="none" normalizeH="0" baseline="0">
+                <a:ln>
+                  <a:noFill/>
+                </a:ln>
+                <a:solidFill>
+                  <a:schemeClr val="tx1"/>
+                </a:solidFill>
+                <a:effectLst/>
+                <a:latin typeface="Arial" panose="020B0604020202020204" pitchFamily="34" charset="0"/>
+              </a:rPr>
+              <a:t>posts</a:t>
+            </a:r>
+            <a:r>
+              <a:rPr kumimoji="0" lang="en-US" altLang="en-US" sz="1100" b="0" i="0" u="none" strike="noStrike" cap="none" normalizeH="0" baseline="0">
+                <a:ln>
+                  <a:noFill/>
+                </a:ln>
+                <a:solidFill>
+                  <a:schemeClr val="tx1"/>
+                </a:solidFill>
+                <a:effectLst/>
+                <a:latin typeface="Arial" panose="020B0604020202020204" pitchFamily="34" charset="0"/>
+              </a:rPr>
+              <a:t> cədvəlini (</a:t>
+            </a:r>
+            <a:r>
+              <a:rPr kumimoji="0" lang="en-US" altLang="en-US" sz="1100" b="1" i="0" u="none" strike="noStrike" cap="none" normalizeH="0" baseline="0">
+                <a:ln>
+                  <a:noFill/>
+                </a:ln>
+                <a:solidFill>
+                  <a:schemeClr val="tx1"/>
+                </a:solidFill>
+                <a:effectLst/>
+                <a:latin typeface="Arial" panose="020B0604020202020204" pitchFamily="34" charset="0"/>
+              </a:rPr>
+              <a:t>table</a:t>
+            </a:r>
+            <a:r>
+              <a:rPr kumimoji="0" lang="en-US" altLang="en-US" sz="1100" b="0" i="0" u="none" strike="noStrike" cap="none" normalizeH="0" baseline="0">
+                <a:ln>
+                  <a:noFill/>
+                </a:ln>
+                <a:solidFill>
+                  <a:schemeClr val="tx1"/>
+                </a:solidFill>
+                <a:effectLst/>
+                <a:latin typeface="Arial" panose="020B0604020202020204" pitchFamily="34" charset="0"/>
+              </a:rPr>
+              <a:t>) hədəf almağa imkan verir.</a:t>
+            </a:r>
+          </a:p>
+          <a:p>
+            <a:pPr algn="just">
+              <a:lnSpc>
+                <a:spcPct val="150000"/>
+              </a:lnSpc>
+              <a:buNone/>
+            </a:pPr>
+            <a:endParaRPr kumimoji="0" lang="en-US" altLang="en-US" sz="1100" b="0" i="0" u="none" strike="noStrike" cap="none" normalizeH="0" baseline="0">
+              <a:ln>
+                <a:noFill/>
+              </a:ln>
+              <a:solidFill>
+                <a:schemeClr val="tx1"/>
+              </a:solidFill>
+              <a:effectLst/>
+              <a:latin typeface="Arial" panose="020B0604020202020204" pitchFamily="34" charset="0"/>
+            </a:endParaRPr>
+          </a:p>
+          <a:p>
+            <a:pPr algn="just">
+              <a:lnSpc>
+                <a:spcPct val="150000"/>
+              </a:lnSpc>
+              <a:buNone/>
+            </a:pPr>
+            <a:r>
+              <a:rPr kumimoji="0" lang="en-US" altLang="en-US" sz="1100" b="0" i="0" u="none" strike="noStrike" cap="none" normalizeH="0" baseline="0">
+                <a:ln>
+                  <a:noFill/>
+                </a:ln>
+                <a:solidFill>
+                  <a:schemeClr val="tx1"/>
+                </a:solidFill>
+                <a:effectLst/>
+                <a:latin typeface="Arial" panose="020B0604020202020204" pitchFamily="34" charset="0"/>
+              </a:rPr>
+              <a:t>Yəni bu metod vasitəsilə biz </a:t>
+            </a:r>
+            <a:r>
+              <a:rPr kumimoji="0" lang="en-US" altLang="en-US" sz="1100" b="1" i="0" u="none" strike="noStrike" cap="none" normalizeH="0" baseline="0">
+                <a:ln>
+                  <a:noFill/>
+                </a:ln>
+                <a:solidFill>
+                  <a:schemeClr val="tx1"/>
+                </a:solidFill>
+                <a:effectLst/>
+                <a:latin typeface="Arial" panose="020B0604020202020204" pitchFamily="34" charset="0"/>
+              </a:rPr>
+              <a:t>posts</a:t>
+            </a:r>
+            <a:r>
+              <a:rPr kumimoji="0" lang="en-US" altLang="en-US" sz="1100" b="0" i="0" u="none" strike="noStrike" cap="none" normalizeH="0" baseline="0">
+                <a:ln>
+                  <a:noFill/>
+                </a:ln>
+                <a:solidFill>
+                  <a:schemeClr val="tx1"/>
+                </a:solidFill>
+                <a:effectLst/>
+                <a:latin typeface="Arial" panose="020B0604020202020204" pitchFamily="34" charset="0"/>
+              </a:rPr>
+              <a:t> adlı cədvəllə işləməyə başlayırıq.</a:t>
+            </a:r>
+            <a:endParaRPr kumimoji="0" lang="az-Latn-AZ" altLang="en-US" sz="1100" b="0" i="0" u="none" strike="noStrike" cap="none" normalizeH="0" baseline="0">
+              <a:ln>
+                <a:noFill/>
+              </a:ln>
+              <a:solidFill>
+                <a:schemeClr val="tx1"/>
+              </a:solidFill>
+              <a:effectLst/>
+              <a:latin typeface="Arial" panose="020B0604020202020204" pitchFamily="34" charset="0"/>
+            </a:endParaRPr>
+          </a:p>
+          <a:p>
+            <a:pPr algn="just">
+              <a:lnSpc>
+                <a:spcPct val="150000"/>
+              </a:lnSpc>
+              <a:buNone/>
+            </a:pPr>
+            <a:endParaRPr lang="az-Latn-AZ" altLang="en-US" sz="1100">
+              <a:latin typeface="Arial" panose="020B0604020202020204" pitchFamily="34" charset="0"/>
+            </a:endParaRPr>
+          </a:p>
+          <a:p>
+            <a:pPr algn="just">
+              <a:lnSpc>
+                <a:spcPct val="150000"/>
+              </a:lnSpc>
+              <a:buNone/>
+            </a:pPr>
+            <a:r>
+              <a:rPr kumimoji="0" lang="en-US" altLang="en-US" sz="1100" b="0" i="0" u="none" strike="noStrike" cap="none" normalizeH="0" baseline="0">
+                <a:ln>
+                  <a:noFill/>
+                </a:ln>
+                <a:solidFill>
+                  <a:schemeClr val="tx1"/>
+                </a:solidFill>
+                <a:effectLst/>
+                <a:latin typeface="Arial" panose="020B0604020202020204" pitchFamily="34" charset="0"/>
+              </a:rPr>
+              <a:t>Bu, sanki </a:t>
+            </a:r>
+            <a:r>
+              <a:rPr kumimoji="0" lang="en-US" altLang="en-US" sz="1100" b="1" i="0" u="none" strike="noStrike" cap="none" normalizeH="0" baseline="0">
+                <a:ln>
+                  <a:noFill/>
+                </a:ln>
+                <a:solidFill>
+                  <a:srgbClr val="0070C0"/>
+                </a:solidFill>
+                <a:effectLst/>
+                <a:latin typeface="Arial" panose="020B0604020202020204" pitchFamily="34" charset="0"/>
+              </a:rPr>
+              <a:t>SELECT * FROM posts </a:t>
+            </a:r>
+            <a:r>
+              <a:rPr kumimoji="0" lang="en-US" altLang="en-US" sz="1100" b="0" i="0" u="none" strike="noStrike" cap="none" normalizeH="0" baseline="0">
+                <a:ln>
+                  <a:noFill/>
+                </a:ln>
+                <a:solidFill>
+                  <a:schemeClr val="tx1"/>
+                </a:solidFill>
+                <a:effectLst/>
+                <a:latin typeface="Arial" panose="020B0604020202020204" pitchFamily="34" charset="0"/>
+              </a:rPr>
+              <a:t>sorğusuna giriş nöqtəsidir, amma hələ heç bir məlumat çağırmır. Yalnız “</a:t>
+            </a:r>
+            <a:r>
+              <a:rPr kumimoji="0" lang="en-US" altLang="en-US" sz="1100" b="1" i="0" u="none" strike="noStrike" cap="none" normalizeH="0" baseline="0">
+                <a:ln>
+                  <a:noFill/>
+                </a:ln>
+                <a:solidFill>
+                  <a:schemeClr val="tx1"/>
+                </a:solidFill>
+                <a:effectLst/>
+                <a:latin typeface="Arial" panose="020B0604020202020204" pitchFamily="34" charset="0"/>
+              </a:rPr>
+              <a:t>posts</a:t>
+            </a:r>
+            <a:r>
+              <a:rPr kumimoji="0" lang="en-US" altLang="en-US" sz="1100" b="0" i="0" u="none" strike="noStrike" cap="none" normalizeH="0" baseline="0">
+                <a:ln>
+                  <a:noFill/>
+                </a:ln>
+                <a:solidFill>
+                  <a:schemeClr val="tx1"/>
+                </a:solidFill>
+                <a:effectLst/>
+                <a:latin typeface="Arial" panose="020B0604020202020204" pitchFamily="34" charset="0"/>
+              </a:rPr>
+              <a:t>” cədvəlinə bağlandığını bildirir.</a:t>
+            </a:r>
+            <a:endParaRPr kumimoji="0" lang="az-Latn-AZ" altLang="en-US" sz="1100" b="0" i="0" u="none" strike="noStrike" cap="none" normalizeH="0" baseline="0">
+              <a:ln>
+                <a:noFill/>
+              </a:ln>
+              <a:solidFill>
+                <a:schemeClr val="tx1"/>
+              </a:solidFill>
+              <a:effectLst/>
+              <a:latin typeface="Arial" panose="020B0604020202020204" pitchFamily="34" charset="0"/>
+            </a:endParaRPr>
+          </a:p>
+          <a:p>
+            <a:pPr algn="just">
+              <a:lnSpc>
+                <a:spcPct val="150000"/>
+              </a:lnSpc>
+              <a:buNone/>
+            </a:pPr>
+            <a:endParaRPr lang="az-Latn-AZ" altLang="en-US" sz="1100">
+              <a:latin typeface="Arial" panose="020B0604020202020204" pitchFamily="34" charset="0"/>
+            </a:endParaRPr>
+          </a:p>
+          <a:p>
+            <a:pPr algn="just">
+              <a:lnSpc>
+                <a:spcPct val="150000"/>
+              </a:lnSpc>
+              <a:buNone/>
+            </a:pPr>
+            <a:endParaRPr kumimoji="0" lang="az-Latn-AZ" altLang="en-US" sz="1100" b="0" i="0" u="none" strike="noStrike" cap="none" normalizeH="0" baseline="0">
+              <a:ln>
+                <a:noFill/>
+              </a:ln>
+              <a:solidFill>
+                <a:schemeClr val="tx1"/>
+              </a:solidFill>
+              <a:effectLst/>
+              <a:latin typeface="Arial" panose="020B0604020202020204" pitchFamily="34" charset="0"/>
+            </a:endParaRPr>
+          </a:p>
+          <a:p>
+            <a:pPr algn="just">
+              <a:lnSpc>
+                <a:spcPct val="150000"/>
+              </a:lnSpc>
+            </a:pPr>
+            <a:r>
+              <a:rPr lang="az-Latn-AZ" altLang="en-US" sz="1100">
+                <a:latin typeface="Arial" panose="020B0604020202020204" pitchFamily="34" charset="0"/>
+              </a:rPr>
+              <a:t>-----------------------------------------------------------------------------------------</a:t>
+            </a:r>
+          </a:p>
+          <a:p>
+            <a:pPr algn="just">
+              <a:lnSpc>
+                <a:spcPct val="150000"/>
+              </a:lnSpc>
+            </a:pPr>
+            <a:endParaRPr lang="az-Latn-AZ" altLang="en-US" sz="1100">
+              <a:latin typeface="Arial" panose="020B0604020202020204" pitchFamily="34" charset="0"/>
+            </a:endParaRPr>
+          </a:p>
+          <a:p>
+            <a:pPr algn="just">
+              <a:lnSpc>
+                <a:spcPct val="150000"/>
+              </a:lnSpc>
+            </a:pPr>
+            <a:r>
+              <a:rPr kumimoji="0" lang="en-US" altLang="en-US" sz="1100" b="1" i="0" u="none" strike="noStrike" cap="none" normalizeH="0" baseline="0">
+                <a:ln>
+                  <a:noFill/>
+                </a:ln>
+                <a:solidFill>
+                  <a:srgbClr val="0070C0"/>
+                </a:solidFill>
+                <a:effectLst/>
+                <a:latin typeface="Arial" panose="020B0604020202020204" pitchFamily="34" charset="0"/>
+              </a:rPr>
+              <a:t>get() </a:t>
+            </a:r>
+            <a:r>
+              <a:rPr kumimoji="0" lang="en-US" altLang="en-US" sz="1100" b="0" i="0" u="none" strike="noStrike" cap="none" normalizeH="0" baseline="0">
+                <a:ln>
+                  <a:noFill/>
+                </a:ln>
+                <a:solidFill>
+                  <a:schemeClr val="tx1"/>
+                </a:solidFill>
+                <a:effectLst/>
+                <a:latin typeface="Arial" panose="020B0604020202020204" pitchFamily="34" charset="0"/>
+              </a:rPr>
+              <a:t>metodu, yazılmış sorguya uyğun gələn bütün nəticələri (</a:t>
+            </a:r>
+            <a:r>
+              <a:rPr kumimoji="0" lang="en-US" altLang="en-US" sz="1100" b="1" i="0" u="none" strike="noStrike" cap="none" normalizeH="0" baseline="0">
+                <a:ln>
+                  <a:noFill/>
+                </a:ln>
+                <a:solidFill>
+                  <a:schemeClr val="tx1"/>
+                </a:solidFill>
+                <a:effectLst/>
+                <a:latin typeface="Arial" panose="020B0604020202020204" pitchFamily="34" charset="0"/>
+              </a:rPr>
+              <a:t>multiple rows</a:t>
+            </a:r>
+            <a:r>
+              <a:rPr kumimoji="0" lang="en-US" altLang="en-US" sz="1100" b="0" i="0" u="none" strike="noStrike" cap="none" normalizeH="0" baseline="0">
+                <a:ln>
+                  <a:noFill/>
+                </a:ln>
+                <a:solidFill>
+                  <a:schemeClr val="tx1"/>
+                </a:solidFill>
+                <a:effectLst/>
+                <a:latin typeface="Arial" panose="020B0604020202020204" pitchFamily="34" charset="0"/>
+              </a:rPr>
+              <a:t>) Collection şəklində qaytarır.</a:t>
+            </a:r>
+          </a:p>
+        </p:txBody>
+      </p:sp>
+      <p:pic>
+        <p:nvPicPr>
+          <p:cNvPr id="4" name="Picture 3">
+            <a:extLst>
+              <a:ext uri="{FF2B5EF4-FFF2-40B4-BE49-F238E27FC236}">
+                <a16:creationId xmlns:a16="http://schemas.microsoft.com/office/drawing/2014/main" id="{1919874A-E6A4-1612-D624-A45F556821EB}"/>
+              </a:ext>
+            </a:extLst>
+          </p:cNvPr>
+          <p:cNvPicPr>
+            <a:picLocks noChangeAspect="1"/>
+          </p:cNvPicPr>
+          <p:nvPr/>
+        </p:nvPicPr>
+        <p:blipFill>
+          <a:blip r:embed="rId2"/>
+          <a:stretch>
+            <a:fillRect/>
+          </a:stretch>
+        </p:blipFill>
+        <p:spPr>
+          <a:xfrm>
+            <a:off x="4967304" y="0"/>
+            <a:ext cx="7224696" cy="6858000"/>
+          </a:xfrm>
+          <a:prstGeom prst="rect">
+            <a:avLst/>
+          </a:prstGeom>
+        </p:spPr>
+      </p:pic>
+    </p:spTree>
+    <p:extLst>
+      <p:ext uri="{BB962C8B-B14F-4D97-AF65-F5344CB8AC3E}">
+        <p14:creationId xmlns:p14="http://schemas.microsoft.com/office/powerpoint/2010/main" val="2123153945"/>
+      </p:ext>
+    </p:extLst>
+  </p:cSld>
+  <p:clrMapOvr>
+    <a:masterClrMapping/>
+  </p:clrMapOvr>
+</p:sld>
+</file>
+
+<file path=ppt/slides/slide10.xml><?xml version="1.0" encoding="utf-8"?>
+<p:sld xmlns:a="http://schemas.openxmlformats.org/drawingml/2006/main" xmlns:r="http://schemas.openxmlformats.org/officeDocument/2006/relationships" xmlns:p="http://schemas.openxmlformats.org/presentationml/2006/main">
+  <p:cSld>
+    <p:spTree>
+      <p:nvGrpSpPr>
+        <p:cNvPr id="1" name="">
+          <a:extLst>
+            <a:ext uri="{FF2B5EF4-FFF2-40B4-BE49-F238E27FC236}">
+              <a16:creationId xmlns:a16="http://schemas.microsoft.com/office/drawing/2014/main" id="{6C8DB954-5454-72E0-D045-C2AA243E9C10}"/>
+            </a:ext>
+          </a:extLst>
+        </p:cNvPr>
+        <p:cNvGrpSpPr/>
+        <p:nvPr/>
+      </p:nvGrpSpPr>
+      <p:grpSpPr>
+        <a:xfrm>
+          <a:off x="0" y="0"/>
+          <a:ext cx="0" cy="0"/>
+          <a:chOff x="0" y="0"/>
+          <a:chExt cx="0" cy="0"/>
+        </a:xfrm>
+      </p:grpSpPr>
+      <p:sp>
+        <p:nvSpPr>
+          <p:cNvPr id="3" name="TextBox 2">
+            <a:extLst>
+              <a:ext uri="{FF2B5EF4-FFF2-40B4-BE49-F238E27FC236}">
+                <a16:creationId xmlns:a16="http://schemas.microsoft.com/office/drawing/2014/main" id="{F66EC83D-46E1-13EE-B9D7-DA8B0F3471F4}"/>
+              </a:ext>
+            </a:extLst>
+          </p:cNvPr>
+          <p:cNvSpPr txBox="1"/>
+          <p:nvPr/>
+        </p:nvSpPr>
+        <p:spPr>
+          <a:xfrm>
+            <a:off x="217714" y="255046"/>
+            <a:ext cx="11756571" cy="2455929"/>
+          </a:xfrm>
+          <a:prstGeom prst="rect">
+            <a:avLst/>
+          </a:prstGeom>
+          <a:noFill/>
+        </p:spPr>
+        <p:txBody>
+          <a:bodyPr wrap="square">
+            <a:spAutoFit/>
+          </a:bodyPr>
+          <a:lstStyle/>
+          <a:p>
+            <a:pPr>
+              <a:lnSpc>
+                <a:spcPct val="150000"/>
+              </a:lnSpc>
+              <a:buNone/>
+            </a:pPr>
+            <a:r>
+              <a:rPr kumimoji="0" lang="en-US" altLang="en-US" sz="1300" b="1" i="0" u="none" strike="noStrike" cap="none" normalizeH="0" baseline="0">
+                <a:ln>
+                  <a:noFill/>
+                </a:ln>
+                <a:solidFill>
+                  <a:srgbClr val="FF0000"/>
+                </a:solidFill>
+                <a:effectLst/>
+                <a:latin typeface="Arial" panose="020B0604020202020204" pitchFamily="34" charset="0"/>
+              </a:rPr>
+              <a:t>orderBy(), limit(), offset()</a:t>
+            </a:r>
+          </a:p>
+          <a:p>
+            <a:pPr>
+              <a:lnSpc>
+                <a:spcPct val="150000"/>
+              </a:lnSpc>
+              <a:buNone/>
+            </a:pPr>
+            <a:r>
+              <a:rPr kumimoji="0" lang="en-US" altLang="en-US" sz="1300" b="0" i="0" u="none" strike="noStrike" cap="none" normalizeH="0" baseline="0">
+                <a:ln>
+                  <a:noFill/>
+                </a:ln>
+                <a:solidFill>
+                  <a:schemeClr val="tx1"/>
+                </a:solidFill>
+                <a:effectLst/>
+                <a:latin typeface="Arial" panose="020B0604020202020204" pitchFamily="34" charset="0"/>
+              </a:rPr>
+              <a:t>Sıralama və limitləmə üçün istifadə olunur.</a:t>
+            </a:r>
+          </a:p>
+          <a:p>
+            <a:pPr>
+              <a:lnSpc>
+                <a:spcPct val="150000"/>
+              </a:lnSpc>
+              <a:buNone/>
+            </a:pPr>
+            <a:r>
+              <a:rPr kumimoji="0" lang="en-US" altLang="en-US" sz="1300" b="0" i="0" u="none" strike="noStrike" cap="none" normalizeH="0" baseline="0">
+                <a:ln>
+                  <a:noFill/>
+                </a:ln>
+                <a:solidFill>
+                  <a:schemeClr val="tx1"/>
+                </a:solidFill>
+                <a:effectLst/>
+                <a:latin typeface="Arial" panose="020B0604020202020204" pitchFamily="34" charset="0"/>
+              </a:rPr>
+              <a:t>- `</a:t>
+            </a:r>
+            <a:r>
+              <a:rPr kumimoji="0" lang="en-US" altLang="en-US" sz="1300" b="1" i="0" u="none" strike="noStrike" cap="none" normalizeH="0" baseline="0">
+                <a:ln>
+                  <a:noFill/>
+                </a:ln>
+                <a:solidFill>
+                  <a:srgbClr val="00B050"/>
+                </a:solidFill>
+                <a:effectLst/>
+                <a:latin typeface="Arial" panose="020B0604020202020204" pitchFamily="34" charset="0"/>
+              </a:rPr>
+              <a:t>orderBy('column', 'direction')</a:t>
+            </a:r>
+            <a:r>
+              <a:rPr kumimoji="0" lang="en-US" altLang="en-US" sz="1300" b="0" i="0" u="none" strike="noStrike" cap="none" normalizeH="0" baseline="0">
+                <a:ln>
+                  <a:noFill/>
+                </a:ln>
+                <a:solidFill>
+                  <a:schemeClr val="tx1"/>
+                </a:solidFill>
+                <a:effectLst/>
+                <a:latin typeface="Arial" panose="020B0604020202020204" pitchFamily="34" charset="0"/>
+              </a:rPr>
+              <a:t>`: Sütuna görə sıralama edir. `</a:t>
+            </a:r>
+            <a:r>
+              <a:rPr kumimoji="0" lang="en-US" altLang="en-US" sz="1300" b="1" i="0" u="none" strike="noStrike" cap="none" normalizeH="0" baseline="0">
+                <a:ln>
+                  <a:noFill/>
+                </a:ln>
+                <a:solidFill>
+                  <a:schemeClr val="tx1"/>
+                </a:solidFill>
+                <a:effectLst/>
+                <a:latin typeface="Arial" panose="020B0604020202020204" pitchFamily="34" charset="0"/>
+              </a:rPr>
+              <a:t>direction</a:t>
+            </a:r>
+            <a:r>
+              <a:rPr kumimoji="0" lang="en-US" altLang="en-US" sz="1300" b="0" i="0" u="none" strike="noStrike" cap="none" normalizeH="0" baseline="0">
+                <a:ln>
+                  <a:noFill/>
+                </a:ln>
+                <a:solidFill>
+                  <a:schemeClr val="tx1"/>
+                </a:solidFill>
+                <a:effectLst/>
+                <a:latin typeface="Arial" panose="020B0604020202020204" pitchFamily="34" charset="0"/>
+              </a:rPr>
+              <a:t>` `</a:t>
+            </a:r>
+            <a:r>
+              <a:rPr kumimoji="0" lang="en-US" altLang="en-US" sz="1300" b="1" i="0" u="none" strike="noStrike" cap="none" normalizeH="0" baseline="0">
+                <a:ln>
+                  <a:noFill/>
+                </a:ln>
+                <a:solidFill>
+                  <a:schemeClr val="tx1"/>
+                </a:solidFill>
+                <a:effectLst/>
+                <a:latin typeface="Arial" panose="020B0604020202020204" pitchFamily="34" charset="0"/>
+              </a:rPr>
+              <a:t>asc</a:t>
+            </a:r>
+            <a:r>
+              <a:rPr kumimoji="0" lang="en-US" altLang="en-US" sz="1300" b="0" i="0" u="none" strike="noStrike" cap="none" normalizeH="0" baseline="0">
+                <a:ln>
+                  <a:noFill/>
+                </a:ln>
+                <a:solidFill>
+                  <a:schemeClr val="tx1"/>
+                </a:solidFill>
+                <a:effectLst/>
+                <a:latin typeface="Arial" panose="020B0604020202020204" pitchFamily="34" charset="0"/>
+              </a:rPr>
+              <a:t>` və ya `</a:t>
+            </a:r>
+            <a:r>
+              <a:rPr kumimoji="0" lang="en-US" altLang="en-US" sz="1300" b="1" i="0" u="none" strike="noStrike" cap="none" normalizeH="0" baseline="0">
+                <a:ln>
+                  <a:noFill/>
+                </a:ln>
+                <a:solidFill>
+                  <a:schemeClr val="tx1"/>
+                </a:solidFill>
+                <a:effectLst/>
+                <a:latin typeface="Arial" panose="020B0604020202020204" pitchFamily="34" charset="0"/>
+              </a:rPr>
+              <a:t>desc</a:t>
+            </a:r>
+            <a:r>
+              <a:rPr kumimoji="0" lang="en-US" altLang="en-US" sz="1300" b="0" i="0" u="none" strike="noStrike" cap="none" normalizeH="0" baseline="0">
+                <a:ln>
+                  <a:noFill/>
+                </a:ln>
+                <a:solidFill>
+                  <a:schemeClr val="tx1"/>
+                </a:solidFill>
+                <a:effectLst/>
+                <a:latin typeface="Arial" panose="020B0604020202020204" pitchFamily="34" charset="0"/>
+              </a:rPr>
+              <a:t>` ola bilər.</a:t>
+            </a:r>
+          </a:p>
+          <a:p>
+            <a:pPr>
+              <a:lnSpc>
+                <a:spcPct val="150000"/>
+              </a:lnSpc>
+              <a:buNone/>
+            </a:pPr>
+            <a:r>
+              <a:rPr kumimoji="0" lang="en-US" altLang="en-US" sz="1300" b="0" i="0" u="none" strike="noStrike" cap="none" normalizeH="0" baseline="0">
+                <a:ln>
+                  <a:noFill/>
+                </a:ln>
+                <a:solidFill>
+                  <a:schemeClr val="tx1"/>
+                </a:solidFill>
+                <a:effectLst/>
+                <a:latin typeface="Arial" panose="020B0604020202020204" pitchFamily="34" charset="0"/>
+              </a:rPr>
+              <a:t>- `</a:t>
+            </a:r>
+            <a:r>
+              <a:rPr kumimoji="0" lang="en-US" altLang="en-US" sz="1300" b="1" i="0" u="none" strike="noStrike" cap="none" normalizeH="0" baseline="0">
+                <a:ln>
+                  <a:noFill/>
+                </a:ln>
+                <a:solidFill>
+                  <a:srgbClr val="00B050"/>
+                </a:solidFill>
+                <a:effectLst/>
+                <a:latin typeface="Arial" panose="020B0604020202020204" pitchFamily="34" charset="0"/>
+              </a:rPr>
+              <a:t>limit(number)</a:t>
+            </a:r>
+            <a:r>
+              <a:rPr kumimoji="0" lang="en-US" altLang="en-US" sz="1300" b="0" i="0" u="none" strike="noStrike" cap="none" normalizeH="0" baseline="0">
+                <a:ln>
+                  <a:noFill/>
+                </a:ln>
+                <a:solidFill>
+                  <a:schemeClr val="tx1"/>
+                </a:solidFill>
+                <a:effectLst/>
+                <a:latin typeface="Arial" panose="020B0604020202020204" pitchFamily="34" charset="0"/>
+              </a:rPr>
+              <a:t>`: Qeydlərin sayını məhdudlaşdırır.</a:t>
+            </a:r>
+          </a:p>
+          <a:p>
+            <a:pPr>
+              <a:lnSpc>
+                <a:spcPct val="150000"/>
+              </a:lnSpc>
+              <a:buNone/>
+            </a:pPr>
+            <a:r>
+              <a:rPr kumimoji="0" lang="en-US" altLang="en-US" sz="1300" b="0" i="0" u="none" strike="noStrike" cap="none" normalizeH="0" baseline="0">
+                <a:ln>
+                  <a:noFill/>
+                </a:ln>
+                <a:solidFill>
+                  <a:schemeClr val="tx1"/>
+                </a:solidFill>
+                <a:effectLst/>
+                <a:latin typeface="Arial" panose="020B0604020202020204" pitchFamily="34" charset="0"/>
+              </a:rPr>
+              <a:t>- `</a:t>
+            </a:r>
+            <a:r>
+              <a:rPr kumimoji="0" lang="en-US" altLang="en-US" sz="1300" b="1" i="0" u="none" strike="noStrike" cap="none" normalizeH="0" baseline="0">
+                <a:ln>
+                  <a:noFill/>
+                </a:ln>
+                <a:solidFill>
+                  <a:srgbClr val="00B050"/>
+                </a:solidFill>
+                <a:effectLst/>
+                <a:latin typeface="Arial" panose="020B0604020202020204" pitchFamily="34" charset="0"/>
+              </a:rPr>
+              <a:t>offset(number)</a:t>
+            </a:r>
+            <a:r>
+              <a:rPr kumimoji="0" lang="en-US" altLang="en-US" sz="1300" b="0" i="0" u="none" strike="noStrike" cap="none" normalizeH="0" baseline="0">
+                <a:ln>
+                  <a:noFill/>
+                </a:ln>
+                <a:solidFill>
+                  <a:schemeClr val="tx1"/>
+                </a:solidFill>
+                <a:effectLst/>
+                <a:latin typeface="Arial" panose="020B0604020202020204" pitchFamily="34" charset="0"/>
+              </a:rPr>
+              <a:t>`: Qeydlərin başlanğıc nöqtəsini təyin edir.</a:t>
+            </a:r>
+            <a:endParaRPr kumimoji="0" lang="az-Latn-AZ" altLang="en-US" sz="1300" b="0" i="0" u="none" strike="noStrike" cap="none" normalizeH="0" baseline="0">
+              <a:ln>
+                <a:noFill/>
+              </a:ln>
+              <a:solidFill>
+                <a:schemeClr val="tx1"/>
+              </a:solidFill>
+              <a:effectLst/>
+              <a:latin typeface="Arial" panose="020B0604020202020204" pitchFamily="34" charset="0"/>
+            </a:endParaRPr>
+          </a:p>
+          <a:p>
+            <a:pPr>
+              <a:lnSpc>
+                <a:spcPct val="150000"/>
+              </a:lnSpc>
+              <a:buNone/>
+            </a:pPr>
+            <a:endParaRPr kumimoji="0" lang="az-Latn-AZ" altLang="en-US" sz="1300" b="0" i="0" u="none" strike="noStrike" cap="none" normalizeH="0" baseline="0">
+              <a:ln>
+                <a:noFill/>
+              </a:ln>
+              <a:solidFill>
+                <a:schemeClr val="tx1"/>
+              </a:solidFill>
+              <a:effectLst/>
+              <a:latin typeface="Arial" panose="020B0604020202020204" pitchFamily="34" charset="0"/>
+            </a:endParaRPr>
+          </a:p>
+          <a:p>
+            <a:pPr>
+              <a:lnSpc>
+                <a:spcPct val="150000"/>
+              </a:lnSpc>
+              <a:buNone/>
+            </a:pPr>
+            <a:endParaRPr kumimoji="0" lang="az-Latn-AZ" altLang="en-US" sz="1300" b="0" i="0" u="none" strike="noStrike" cap="none" normalizeH="0" baseline="0">
+              <a:ln>
+                <a:noFill/>
+              </a:ln>
+              <a:solidFill>
+                <a:schemeClr val="tx1"/>
+              </a:solidFill>
+              <a:effectLst/>
+              <a:latin typeface="Arial" panose="020B0604020202020204" pitchFamily="34" charset="0"/>
+            </a:endParaRPr>
+          </a:p>
+          <a:p>
+            <a:pPr>
+              <a:lnSpc>
+                <a:spcPct val="150000"/>
+              </a:lnSpc>
+              <a:buNone/>
+            </a:pPr>
+            <a:r>
+              <a:rPr kumimoji="0" lang="en-US" altLang="en-US" sz="1300" b="1" i="0" u="none" strike="noStrike" cap="none" normalizeH="0" baseline="0">
+                <a:ln>
+                  <a:noFill/>
+                </a:ln>
+                <a:solidFill>
+                  <a:srgbClr val="FF0000"/>
+                </a:solidFill>
+                <a:effectLst/>
+                <a:latin typeface="Arial" panose="020B0604020202020204" pitchFamily="34" charset="0"/>
+              </a:rPr>
+              <a:t>$latest = DB::table('posts')-&gt;orderBy('created_at', 'desc')-&gt;limit(5)-&gt;get();</a:t>
+            </a:r>
+          </a:p>
+        </p:txBody>
+      </p:sp>
+      <p:pic>
+        <p:nvPicPr>
+          <p:cNvPr id="4" name="Picture 3">
+            <a:extLst>
+              <a:ext uri="{FF2B5EF4-FFF2-40B4-BE49-F238E27FC236}">
+                <a16:creationId xmlns:a16="http://schemas.microsoft.com/office/drawing/2014/main" id="{D1D62CC3-8BE3-CDE2-2B71-B7B2D92DFC02}"/>
+              </a:ext>
+            </a:extLst>
+          </p:cNvPr>
+          <p:cNvPicPr>
+            <a:picLocks noChangeAspect="1"/>
+          </p:cNvPicPr>
+          <p:nvPr/>
+        </p:nvPicPr>
+        <p:blipFill>
+          <a:blip r:embed="rId2"/>
+          <a:stretch>
+            <a:fillRect/>
+          </a:stretch>
+        </p:blipFill>
+        <p:spPr>
+          <a:xfrm>
+            <a:off x="217714" y="2902377"/>
+            <a:ext cx="7525800" cy="657317"/>
+          </a:xfrm>
+          <a:prstGeom prst="rect">
+            <a:avLst/>
+          </a:prstGeom>
+        </p:spPr>
+      </p:pic>
+    </p:spTree>
+    <p:extLst>
+      <p:ext uri="{BB962C8B-B14F-4D97-AF65-F5344CB8AC3E}">
+        <p14:creationId xmlns:p14="http://schemas.microsoft.com/office/powerpoint/2010/main" val="2876987525"/>
+      </p:ext>
+    </p:extLst>
+  </p:cSld>
+  <p:clrMapOvr>
+    <a:masterClrMapping/>
+  </p:clrMapOvr>
+</p:sld>
+</file>
+
+<file path=ppt/slides/slide11.xml><?xml version="1.0" encoding="utf-8"?>
+<p:sld xmlns:a="http://schemas.openxmlformats.org/drawingml/2006/main" xmlns:r="http://schemas.openxmlformats.org/officeDocument/2006/relationships" xmlns:p="http://schemas.openxmlformats.org/presentationml/2006/main">
+  <p:cSld>
+    <p:spTree>
+      <p:nvGrpSpPr>
+        <p:cNvPr id="1" name="">
+          <a:extLst>
+            <a:ext uri="{FF2B5EF4-FFF2-40B4-BE49-F238E27FC236}">
+              <a16:creationId xmlns:a16="http://schemas.microsoft.com/office/drawing/2014/main" id="{8BB709DF-A808-EC32-CF1F-26961E52200C}"/>
+            </a:ext>
+          </a:extLst>
+        </p:cNvPr>
+        <p:cNvGrpSpPr/>
+        <p:nvPr/>
+      </p:nvGrpSpPr>
+      <p:grpSpPr>
+        <a:xfrm>
+          <a:off x="0" y="0"/>
+          <a:ext cx="0" cy="0"/>
+          <a:chOff x="0" y="0"/>
+          <a:chExt cx="0" cy="0"/>
+        </a:xfrm>
+      </p:grpSpPr>
+      <p:sp>
+        <p:nvSpPr>
+          <p:cNvPr id="3" name="TextBox 2">
+            <a:extLst>
+              <a:ext uri="{FF2B5EF4-FFF2-40B4-BE49-F238E27FC236}">
+                <a16:creationId xmlns:a16="http://schemas.microsoft.com/office/drawing/2014/main" id="{F02A191D-368B-8D26-6950-901FCDA16A42}"/>
+              </a:ext>
+            </a:extLst>
+          </p:cNvPr>
+          <p:cNvSpPr txBox="1"/>
+          <p:nvPr/>
+        </p:nvSpPr>
+        <p:spPr>
+          <a:xfrm>
             <a:off x="217714" y="255046"/>
             <a:ext cx="11756571" cy="355354"/>
           </a:xfrm>
@@ -3389,7 +4503,7 @@
     </p:spTree>
     <p:extLst>
       <p:ext uri="{BB962C8B-B14F-4D97-AF65-F5344CB8AC3E}">
-        <p14:creationId xmlns:p14="http://schemas.microsoft.com/office/powerpoint/2010/main" val="2123153945"/>
+        <p14:creationId xmlns:p14="http://schemas.microsoft.com/office/powerpoint/2010/main" val="4079784358"/>
       </p:ext>
     </p:extLst>
   </p:cSld>
@@ -3472,6 +4586,36 @@
           </a:p>
         </p:txBody>
       </p:sp>
+      <p:pic>
+        <p:nvPicPr>
+          <p:cNvPr id="4" name="Picture 3">
+            <a:extLst>
+              <a:ext uri="{FF2B5EF4-FFF2-40B4-BE49-F238E27FC236}">
+                <a16:creationId xmlns:a16="http://schemas.microsoft.com/office/drawing/2014/main" id="{78D17F42-5465-FD98-4E48-5B7AA3533627}"/>
+              </a:ext>
+            </a:extLst>
+          </p:cNvPr>
+          <p:cNvPicPr>
+            <a:picLocks noChangeAspect="1"/>
+          </p:cNvPicPr>
+          <p:nvPr/>
+        </p:nvPicPr>
+        <p:blipFill>
+          <a:blip r:embed="rId2"/>
+          <a:stretch>
+            <a:fillRect/>
+          </a:stretch>
+        </p:blipFill>
+        <p:spPr>
+          <a:xfrm>
+            <a:off x="0" y="47228"/>
+            <a:ext cx="12192000" cy="6763544"/>
+          </a:xfrm>
+          <a:prstGeom prst="rect">
+            <a:avLst/>
+          </a:prstGeom>
+        </p:spPr>
+      </p:pic>
     </p:spTree>
     <p:extLst>
       <p:ext uri="{BB962C8B-B14F-4D97-AF65-F5344CB8AC3E}">
@@ -3523,7 +4667,7 @@
         <p:spPr>
           <a:xfrm>
             <a:off x="217714" y="255046"/>
-            <a:ext cx="11756571" cy="355354"/>
+            <a:ext cx="11756571" cy="2314544"/>
           </a:xfrm>
           <a:prstGeom prst="rect">
             <a:avLst/>
@@ -3536,28 +4680,326 @@
           </a:bodyPr>
           <a:lstStyle/>
           <a:p>
-            <a:pPr>
+            <a:pPr algn="just">
               <a:lnSpc>
                 <a:spcPct val="150000"/>
               </a:lnSpc>
               <a:buNone/>
             </a:pPr>
             <a:r>
-              <a:rPr kumimoji="0" lang="en-US" altLang="en-US" sz="1300" b="0" i="0" u="none" strike="noStrike" cap="none" normalizeH="0" baseline="0">
-                <a:ln>
-                  <a:noFill/>
-                </a:ln>
-                <a:solidFill>
-                  <a:schemeClr val="tx1"/>
-                </a:solidFill>
-                <a:effectLst/>
-                <a:latin typeface="Arial" panose="020B0604020202020204" pitchFamily="34" charset="0"/>
-              </a:rPr>
-              <a:t>.</a:t>
-            </a:r>
-          </a:p>
-        </p:txBody>
-      </p:sp>
+              <a:rPr kumimoji="0" lang="en-US" altLang="en-US" sz="1400" b="1" i="0" u="none" strike="noStrike" cap="none" normalizeH="0" baseline="0">
+                <a:ln>
+                  <a:noFill/>
+                </a:ln>
+                <a:solidFill>
+                  <a:srgbClr val="0070C0"/>
+                </a:solidFill>
+                <a:effectLst/>
+                <a:latin typeface="Arial" panose="020B0604020202020204" pitchFamily="34" charset="0"/>
+              </a:rPr>
+              <a:t>find(7)</a:t>
+            </a:r>
+            <a:r>
+              <a:rPr kumimoji="0" lang="en-US" altLang="en-US" sz="1400" b="0" i="0" u="none" strike="noStrike" cap="none" normalizeH="0" baseline="0">
+                <a:ln>
+                  <a:noFill/>
+                </a:ln>
+                <a:solidFill>
+                  <a:schemeClr val="tx1"/>
+                </a:solidFill>
+                <a:effectLst/>
+                <a:latin typeface="Arial" panose="020B0604020202020204" pitchFamily="34" charset="0"/>
+              </a:rPr>
+              <a:t> metodu cədvəldə </a:t>
+            </a:r>
+            <a:r>
+              <a:rPr kumimoji="0" lang="en-US" altLang="en-US" sz="1400" b="1" i="0" u="none" strike="noStrike" cap="none" normalizeH="0" baseline="0">
+                <a:ln>
+                  <a:noFill/>
+                </a:ln>
+                <a:solidFill>
+                  <a:srgbClr val="0070C0"/>
+                </a:solidFill>
+                <a:effectLst/>
+                <a:latin typeface="Arial" panose="020B0604020202020204" pitchFamily="34" charset="0"/>
+              </a:rPr>
+              <a:t>id = 7 </a:t>
+            </a:r>
+            <a:r>
+              <a:rPr kumimoji="0" lang="en-US" altLang="en-US" sz="1400" b="0" i="0" u="none" strike="noStrike" cap="none" normalizeH="0" baseline="0">
+                <a:ln>
+                  <a:noFill/>
+                </a:ln>
+                <a:solidFill>
+                  <a:schemeClr val="tx1"/>
+                </a:solidFill>
+                <a:effectLst/>
+                <a:latin typeface="Arial" panose="020B0604020202020204" pitchFamily="34" charset="0"/>
+              </a:rPr>
+              <a:t>olan sətiri (</a:t>
+            </a:r>
+            <a:r>
+              <a:rPr kumimoji="0" lang="en-US" altLang="en-US" sz="1400" b="1" i="0" u="none" strike="noStrike" cap="none" normalizeH="0" baseline="0">
+                <a:ln>
+                  <a:noFill/>
+                </a:ln>
+                <a:solidFill>
+                  <a:schemeClr val="tx1"/>
+                </a:solidFill>
+                <a:effectLst/>
+                <a:latin typeface="Arial" panose="020B0604020202020204" pitchFamily="34" charset="0"/>
+              </a:rPr>
+              <a:t>record</a:t>
+            </a:r>
+            <a:r>
+              <a:rPr kumimoji="0" lang="en-US" altLang="en-US" sz="1400" b="0" i="0" u="none" strike="noStrike" cap="none" normalizeH="0" baseline="0">
+                <a:ln>
+                  <a:noFill/>
+                </a:ln>
+                <a:solidFill>
+                  <a:schemeClr val="tx1"/>
+                </a:solidFill>
+                <a:effectLst/>
+                <a:latin typeface="Arial" panose="020B0604020202020204" pitchFamily="34" charset="0"/>
+              </a:rPr>
+              <a:t>-u) tapıb qaytarır.</a:t>
+            </a:r>
+          </a:p>
+          <a:p>
+            <a:pPr algn="just">
+              <a:lnSpc>
+                <a:spcPct val="150000"/>
+              </a:lnSpc>
+              <a:buNone/>
+            </a:pPr>
+            <a:endParaRPr kumimoji="0" lang="en-US" altLang="en-US" sz="1400" b="0" i="0" u="none" strike="noStrike" cap="none" normalizeH="0" baseline="0">
+              <a:ln>
+                <a:noFill/>
+              </a:ln>
+              <a:solidFill>
+                <a:schemeClr val="tx1"/>
+              </a:solidFill>
+              <a:effectLst/>
+              <a:latin typeface="Arial" panose="020B0604020202020204" pitchFamily="34" charset="0"/>
+            </a:endParaRPr>
+          </a:p>
+          <a:p>
+            <a:pPr algn="just">
+              <a:lnSpc>
+                <a:spcPct val="150000"/>
+              </a:lnSpc>
+              <a:buNone/>
+            </a:pPr>
+            <a:r>
+              <a:rPr kumimoji="0" lang="en-US" altLang="en-US" sz="1400" b="0" i="0" u="none" strike="noStrike" cap="none" normalizeH="0" baseline="0">
+                <a:ln>
+                  <a:noFill/>
+                </a:ln>
+                <a:solidFill>
+                  <a:schemeClr val="tx1"/>
+                </a:solidFill>
+                <a:effectLst/>
+                <a:latin typeface="Arial" panose="020B0604020202020204" pitchFamily="34" charset="0"/>
+              </a:rPr>
+              <a:t>💡 </a:t>
+            </a:r>
+            <a:r>
+              <a:rPr kumimoji="0" lang="en-US" altLang="en-US" sz="1400" b="1" i="0" u="none" strike="noStrike" cap="none" normalizeH="0" baseline="0">
+                <a:ln>
+                  <a:noFill/>
+                </a:ln>
+                <a:solidFill>
+                  <a:schemeClr val="tx1"/>
+                </a:solidFill>
+                <a:effectLst/>
+                <a:latin typeface="Arial" panose="020B0604020202020204" pitchFamily="34" charset="0"/>
+              </a:rPr>
+              <a:t>Vacib məqamlar</a:t>
+            </a:r>
+            <a:r>
+              <a:rPr kumimoji="0" lang="en-US" altLang="en-US" sz="1400" b="0" i="0" u="none" strike="noStrike" cap="none" normalizeH="0" baseline="0">
+                <a:ln>
+                  <a:noFill/>
+                </a:ln>
+                <a:solidFill>
+                  <a:schemeClr val="tx1"/>
+                </a:solidFill>
+                <a:effectLst/>
+                <a:latin typeface="Arial" panose="020B0604020202020204" pitchFamily="34" charset="0"/>
+              </a:rPr>
+              <a:t>:</a:t>
+            </a:r>
+          </a:p>
+          <a:p>
+            <a:pPr marL="171450" indent="-171450" algn="just">
+              <a:lnSpc>
+                <a:spcPct val="150000"/>
+              </a:lnSpc>
+              <a:buFont typeface="Arial" panose="020B0604020202020204" pitchFamily="34" charset="0"/>
+              <a:buChar char="•"/>
+            </a:pPr>
+            <a:r>
+              <a:rPr kumimoji="0" lang="en-US" altLang="en-US" sz="1400" b="0" i="0" u="none" strike="noStrike" cap="none" normalizeH="0" baseline="0">
+                <a:ln>
+                  <a:noFill/>
+                </a:ln>
+                <a:solidFill>
+                  <a:schemeClr val="tx1"/>
+                </a:solidFill>
+                <a:effectLst/>
+                <a:latin typeface="Arial" panose="020B0604020202020204" pitchFamily="34" charset="0"/>
+              </a:rPr>
+              <a:t>Bu metod yalnız </a:t>
+            </a:r>
+            <a:r>
+              <a:rPr kumimoji="0" lang="en-US" altLang="en-US" sz="1400" b="1" i="0" u="none" strike="noStrike" cap="none" normalizeH="0" baseline="0">
+                <a:ln>
+                  <a:noFill/>
+                </a:ln>
+                <a:solidFill>
+                  <a:schemeClr val="tx1"/>
+                </a:solidFill>
+                <a:effectLst/>
+                <a:latin typeface="Arial" panose="020B0604020202020204" pitchFamily="34" charset="0"/>
+              </a:rPr>
+              <a:t>id</a:t>
+            </a:r>
+            <a:r>
+              <a:rPr kumimoji="0" lang="en-US" altLang="en-US" sz="1400" b="0" i="0" u="none" strike="noStrike" cap="none" normalizeH="0" baseline="0">
+                <a:ln>
+                  <a:noFill/>
+                </a:ln>
+                <a:solidFill>
+                  <a:schemeClr val="tx1"/>
+                </a:solidFill>
+                <a:effectLst/>
+                <a:latin typeface="Arial" panose="020B0604020202020204" pitchFamily="34" charset="0"/>
+              </a:rPr>
+              <a:t> sütunu üzərindən axtarış edir.</a:t>
+            </a:r>
+          </a:p>
+          <a:p>
+            <a:pPr marL="171450" indent="-171450" algn="just">
+              <a:lnSpc>
+                <a:spcPct val="150000"/>
+              </a:lnSpc>
+              <a:buFont typeface="Arial" panose="020B0604020202020204" pitchFamily="34" charset="0"/>
+              <a:buChar char="•"/>
+            </a:pPr>
+            <a:r>
+              <a:rPr kumimoji="0" lang="en-US" altLang="en-US" sz="1400" b="0" i="0" u="none" strike="noStrike" cap="none" normalizeH="0" baseline="0">
+                <a:ln>
+                  <a:noFill/>
+                </a:ln>
+                <a:solidFill>
+                  <a:schemeClr val="tx1"/>
+                </a:solidFill>
+                <a:effectLst/>
+                <a:latin typeface="Arial" panose="020B0604020202020204" pitchFamily="34" charset="0"/>
+              </a:rPr>
+              <a:t>Əgər belə bir qeyd yoxdursa, </a:t>
+            </a:r>
+            <a:r>
+              <a:rPr kumimoji="0" lang="en-US" altLang="en-US" sz="1400" b="1" i="0" u="none" strike="noStrike" cap="none" normalizeH="0" baseline="0">
+                <a:ln>
+                  <a:noFill/>
+                </a:ln>
+                <a:solidFill>
+                  <a:schemeClr val="tx1"/>
+                </a:solidFill>
+                <a:effectLst/>
+                <a:latin typeface="Arial" panose="020B0604020202020204" pitchFamily="34" charset="0"/>
+              </a:rPr>
+              <a:t>null</a:t>
+            </a:r>
+            <a:r>
+              <a:rPr kumimoji="0" lang="en-US" altLang="en-US" sz="1400" b="0" i="0" u="none" strike="noStrike" cap="none" normalizeH="0" baseline="0">
+                <a:ln>
+                  <a:noFill/>
+                </a:ln>
+                <a:solidFill>
+                  <a:schemeClr val="tx1"/>
+                </a:solidFill>
+                <a:effectLst/>
+                <a:latin typeface="Arial" panose="020B0604020202020204" pitchFamily="34" charset="0"/>
+              </a:rPr>
+              <a:t> qaytarır.</a:t>
+            </a:r>
+          </a:p>
+          <a:p>
+            <a:pPr marL="171450" indent="-171450" algn="just">
+              <a:lnSpc>
+                <a:spcPct val="150000"/>
+              </a:lnSpc>
+              <a:buFont typeface="Arial" panose="020B0604020202020204" pitchFamily="34" charset="0"/>
+              <a:buChar char="•"/>
+            </a:pPr>
+            <a:r>
+              <a:rPr kumimoji="0" lang="en-US" altLang="en-US" sz="1400" b="0" i="0" u="none" strike="noStrike" cap="none" normalizeH="0" baseline="0">
+                <a:ln>
+                  <a:noFill/>
+                </a:ln>
+                <a:solidFill>
+                  <a:schemeClr val="tx1"/>
+                </a:solidFill>
+                <a:effectLst/>
+                <a:latin typeface="Arial" panose="020B0604020202020204" pitchFamily="34" charset="0"/>
+              </a:rPr>
+              <a:t>Yalnız bir nəticə qaytarır.</a:t>
+            </a:r>
+            <a:endParaRPr kumimoji="0" lang="az-Latn-AZ" altLang="en-US" sz="1400" b="0" i="0" u="none" strike="noStrike" cap="none" normalizeH="0" baseline="0">
+              <a:ln>
+                <a:noFill/>
+              </a:ln>
+              <a:solidFill>
+                <a:schemeClr val="tx1"/>
+              </a:solidFill>
+              <a:effectLst/>
+              <a:latin typeface="Arial" panose="020B0604020202020204" pitchFamily="34" charset="0"/>
+            </a:endParaRPr>
+          </a:p>
+          <a:p>
+            <a:pPr algn="just">
+              <a:lnSpc>
+                <a:spcPct val="150000"/>
+              </a:lnSpc>
+            </a:pPr>
+            <a:endParaRPr lang="az-Latn-AZ" altLang="en-US" sz="1400">
+              <a:latin typeface="Arial" panose="020B0604020202020204" pitchFamily="34" charset="0"/>
+            </a:endParaRPr>
+          </a:p>
+        </p:txBody>
+      </p:sp>
+      <p:pic>
+        <p:nvPicPr>
+          <p:cNvPr id="4" name="Picture 3">
+            <a:extLst>
+              <a:ext uri="{FF2B5EF4-FFF2-40B4-BE49-F238E27FC236}">
+                <a16:creationId xmlns:a16="http://schemas.microsoft.com/office/drawing/2014/main" id="{A96EAB29-EEB2-BE3B-9B52-F3B53695A5AF}"/>
+              </a:ext>
+            </a:extLst>
+          </p:cNvPr>
+          <p:cNvPicPr>
+            <a:picLocks noChangeAspect="1"/>
+          </p:cNvPicPr>
+          <p:nvPr/>
+        </p:nvPicPr>
+        <p:blipFill>
+          <a:blip r:embed="rId2"/>
+          <a:stretch>
+            <a:fillRect/>
+          </a:stretch>
+        </p:blipFill>
+        <p:spPr>
+          <a:xfrm>
+            <a:off x="7219256" y="2856942"/>
+            <a:ext cx="4972744" cy="4001058"/>
+          </a:xfrm>
+          <a:prstGeom prst="rect">
+            <a:avLst/>
+          </a:prstGeom>
+        </p:spPr>
+      </p:pic>
     </p:spTree>
     <p:extLst>
       <p:ext uri="{BB962C8B-B14F-4D97-AF65-F5344CB8AC3E}">
@@ -3594,56 +5036,36 @@
           <a:chExt cx="0" cy="0"/>
         </a:xfrm>
       </p:grpSpPr>
-      <p:sp>
-        <p:nvSpPr>
-          <p:cNvPr id="3" name="TextBox 2">
-            <a:extLst>
-              <a:ext uri="{FF2B5EF4-FFF2-40B4-BE49-F238E27FC236}">
-                <a16:creationId xmlns:a16="http://schemas.microsoft.com/office/drawing/2014/main" id="{D0C1D576-E98F-4E42-CEBC-046D35CA6AF7}"/>
-              </a:ext>
-            </a:extLst>
-          </p:cNvPr>
-          <p:cNvSpPr txBox="1"/>
+      <p:pic>
+        <p:nvPicPr>
+          <p:cNvPr id="4" name="Picture 3">
+            <a:extLst>
+              <a:ext uri="{FF2B5EF4-FFF2-40B4-BE49-F238E27FC236}">
+                <a16:creationId xmlns:a16="http://schemas.microsoft.com/office/drawing/2014/main" id="{B557106A-B4DB-46E3-BB1F-3A6B9EC75470}"/>
+              </a:ext>
+            </a:extLst>
+          </p:cNvPr>
+          <p:cNvPicPr>
+            <a:picLocks noChangeAspect="1"/>
+          </p:cNvPicPr>
           <p:nvPr/>
-        </p:nvSpPr>
+        </p:nvPicPr>
+        <p:blipFill>
+          <a:blip r:embed="rId2"/>
+          <a:stretch>
+            <a:fillRect/>
+          </a:stretch>
+        </p:blipFill>
         <p:spPr>
           <a:xfrm>
-            <a:off x="217714" y="255046"/>
-            <a:ext cx="11756571" cy="355354"/>
+            <a:off x="970835" y="1056944"/>
+            <a:ext cx="10250330" cy="4744112"/>
           </a:xfrm>
           <a:prstGeom prst="rect">
             <a:avLst/>
           </a:prstGeom>
-          <a:noFill/>
         </p:spPr>
-        <p:txBody>
-          <a:bodyPr wrap="square">
-            <a:spAutoFit/>
-          </a:bodyPr>
-          <a:lstStyle/>
-          <a:p>
-            <a:pPr>
-              <a:lnSpc>
-                <a:spcPct val="150000"/>
-              </a:lnSpc>
-              <a:buNone/>
-            </a:pPr>
-            <a:r>
-              <a:rPr kumimoji="0" lang="en-US" altLang="en-US" sz="1300" b="0" i="0" u="none" strike="noStrike" cap="none" normalizeH="0" baseline="0">
-                <a:ln>
-                  <a:noFill/>
-                </a:ln>
-                <a:solidFill>
-                  <a:schemeClr val="tx1"/>
-                </a:solidFill>
-                <a:effectLst/>
-                <a:latin typeface="Arial" panose="020B0604020202020204" pitchFamily="34" charset="0"/>
-              </a:rPr>
-              <a:t>.</a:t>
-            </a:r>
-          </a:p>
-        </p:txBody>
-      </p:sp>
+      </p:pic>
     </p:spTree>
     <p:extLst>
       <p:ext uri="{BB962C8B-B14F-4D97-AF65-F5344CB8AC3E}">
@@ -3695,6 +5117,215 @@
         <p:spPr>
           <a:xfrm>
             <a:off x="217714" y="255046"/>
+            <a:ext cx="11756571" cy="955518"/>
+          </a:xfrm>
+          <a:prstGeom prst="rect">
+            <a:avLst/>
+          </a:prstGeom>
+          <a:noFill/>
+        </p:spPr>
+        <p:txBody>
+          <a:bodyPr wrap="square">
+            <a:spAutoFit/>
+          </a:bodyPr>
+          <a:lstStyle/>
+          <a:p>
+            <a:pPr>
+              <a:lnSpc>
+                <a:spcPct val="150000"/>
+              </a:lnSpc>
+            </a:pPr>
+            <a:r>
+              <a:rPr kumimoji="0" lang="en-US" altLang="en-US" sz="1300" b="1" i="0" u="none" strike="noStrike" cap="none" normalizeH="0" baseline="0">
+                <a:ln>
+                  <a:noFill/>
+                </a:ln>
+                <a:solidFill>
+                  <a:schemeClr val="tx1"/>
+                </a:solidFill>
+                <a:effectLst/>
+                <a:latin typeface="Arial" panose="020B0604020202020204" pitchFamily="34" charset="0"/>
+              </a:rPr>
+              <a:t>Laravel Query Builder</a:t>
+            </a:r>
+            <a:r>
+              <a:rPr kumimoji="0" lang="en-US" altLang="en-US" sz="1300" b="0" i="0" u="none" strike="noStrike" cap="none" normalizeH="0" baseline="0">
+                <a:ln>
+                  <a:noFill/>
+                </a:ln>
+                <a:solidFill>
+                  <a:schemeClr val="tx1"/>
+                </a:solidFill>
+                <a:effectLst/>
+                <a:latin typeface="Arial" panose="020B0604020202020204" pitchFamily="34" charset="0"/>
+              </a:rPr>
+              <a:t>-də istifadə olunan bir neçə önəmli metod:</a:t>
+            </a:r>
+            <a:r>
+              <a:rPr kumimoji="0" lang="az-Latn-AZ" altLang="en-US" sz="1300" b="0" i="0" u="none" strike="noStrike" cap="none" normalizeH="0" baseline="0">
+                <a:ln>
+                  <a:noFill/>
+                </a:ln>
+                <a:solidFill>
+                  <a:schemeClr val="tx1"/>
+                </a:solidFill>
+                <a:effectLst/>
+                <a:latin typeface="Arial" panose="020B0604020202020204" pitchFamily="34" charset="0"/>
+              </a:rPr>
+              <a:t> </a:t>
+            </a:r>
+            <a:r>
+              <a:rPr kumimoji="0" lang="en-US" altLang="en-US" sz="1200" b="1" i="0" u="none" strike="noStrike" cap="none" normalizeH="0" baseline="0">
+                <a:ln>
+                  <a:noFill/>
+                </a:ln>
+                <a:solidFill>
+                  <a:srgbClr val="FF0000"/>
+                </a:solidFill>
+                <a:effectLst/>
+                <a:latin typeface="Arial" panose="020B0604020202020204" pitchFamily="34" charset="0"/>
+              </a:rPr>
+              <a:t>$user = DB::table('users')-&gt;where('email', 'admin@example.com')-&gt;first();</a:t>
+            </a:r>
+            <a:endParaRPr kumimoji="0" lang="az-Latn-AZ" altLang="en-US" sz="1300" b="0" i="0" u="none" strike="noStrike" cap="none" normalizeH="0" baseline="0">
+              <a:ln>
+                <a:noFill/>
+              </a:ln>
+              <a:solidFill>
+                <a:schemeClr val="tx1"/>
+              </a:solidFill>
+              <a:effectLst/>
+              <a:latin typeface="Arial" panose="020B0604020202020204" pitchFamily="34" charset="0"/>
+            </a:endParaRPr>
+          </a:p>
+          <a:p>
+            <a:pPr>
+              <a:lnSpc>
+                <a:spcPct val="150000"/>
+              </a:lnSpc>
+              <a:buNone/>
+            </a:pPr>
+            <a:endParaRPr lang="az-Latn-AZ" altLang="en-US" sz="1300">
+              <a:latin typeface="Arial" panose="020B0604020202020204" pitchFamily="34" charset="0"/>
+            </a:endParaRPr>
+          </a:p>
+          <a:p>
+            <a:pPr>
+              <a:lnSpc>
+                <a:spcPct val="150000"/>
+              </a:lnSpc>
+              <a:buNone/>
+            </a:pPr>
+            <a:r>
+              <a:rPr kumimoji="0" lang="en-US" altLang="en-US" sz="1300" b="1" i="0" u="none" strike="noStrike" cap="none" normalizeH="0" baseline="0">
+                <a:ln>
+                  <a:noFill/>
+                </a:ln>
+                <a:solidFill>
+                  <a:srgbClr val="FF0000"/>
+                </a:solidFill>
+                <a:effectLst/>
+                <a:latin typeface="Arial" panose="020B0604020202020204" pitchFamily="34" charset="0"/>
+              </a:rPr>
+              <a:t>first() </a:t>
+            </a:r>
+            <a:r>
+              <a:rPr kumimoji="0" lang="en-US" altLang="en-US" sz="1300" b="0" i="0" u="none" strike="noStrike" cap="none" normalizeH="0" baseline="0">
+                <a:ln>
+                  <a:noFill/>
+                </a:ln>
+                <a:solidFill>
+                  <a:schemeClr val="tx1"/>
+                </a:solidFill>
+                <a:effectLst/>
+                <a:latin typeface="Arial" panose="020B0604020202020204" pitchFamily="34" charset="0"/>
+              </a:rPr>
+              <a:t>- İlk uyğun gələn qeydi qaytarır.</a:t>
+            </a:r>
+          </a:p>
+        </p:txBody>
+      </p:sp>
+      <p:pic>
+        <p:nvPicPr>
+          <p:cNvPr id="4" name="Picture 3">
+            <a:extLst>
+              <a:ext uri="{FF2B5EF4-FFF2-40B4-BE49-F238E27FC236}">
+                <a16:creationId xmlns:a16="http://schemas.microsoft.com/office/drawing/2014/main" id="{19D65220-A547-C4EB-3B23-9761D8492794}"/>
+              </a:ext>
+            </a:extLst>
+          </p:cNvPr>
+          <p:cNvPicPr>
+            <a:picLocks noChangeAspect="1"/>
+          </p:cNvPicPr>
+          <p:nvPr/>
+        </p:nvPicPr>
+        <p:blipFill>
+          <a:blip r:embed="rId2"/>
+          <a:stretch>
+            <a:fillRect/>
+          </a:stretch>
+        </p:blipFill>
+        <p:spPr>
+          <a:xfrm>
+            <a:off x="217714" y="1497885"/>
+            <a:ext cx="7335274" cy="638264"/>
+          </a:xfrm>
+          <a:prstGeom prst="rect">
+            <a:avLst/>
+          </a:prstGeom>
+        </p:spPr>
+      </p:pic>
+    </p:spTree>
+    <p:extLst>
+      <p:ext uri="{BB962C8B-B14F-4D97-AF65-F5344CB8AC3E}">
+        <p14:creationId xmlns:p14="http://schemas.microsoft.com/office/powerpoint/2010/main" val="3095838342"/>
+      </p:ext>
+    </p:extLst>
+  </p:cSld>
+  <p:clrMapOvr>
+    <a:masterClrMapping/>
+  </p:clrMapOvr>
+</p:sld>
+</file>
+
+<file path=ppt/slides/slide6.xml><?xml version="1.0" encoding="utf-8"?>
+<p:sld xmlns:a="http://schemas.openxmlformats.org/drawingml/2006/main" xmlns:r="http://schemas.openxmlformats.org/officeDocument/2006/relationships" xmlns:p="http://schemas.openxmlformats.org/presentationml/2006/main">
+  <p:cSld>
+    <p:spTree>
+      <p:nvGrpSpPr>
+        <p:cNvPr id="1" name="">
+          <a:extLst>
+            <a:ext uri="{FF2B5EF4-FFF2-40B4-BE49-F238E27FC236}">
+              <a16:creationId xmlns:a16="http://schemas.microsoft.com/office/drawing/2014/main" id="{22143C54-2E23-5695-C446-1A112C06CE9C}"/>
+            </a:ext>
+          </a:extLst>
+        </p:cNvPr>
+        <p:cNvGrpSpPr/>
+        <p:nvPr/>
+      </p:nvGrpSpPr>
+      <p:grpSpPr>
+        <a:xfrm>
+          <a:off x="0" y="0"/>
+          <a:ext cx="0" cy="0"/>
+          <a:chOff x="0" y="0"/>
+          <a:chExt cx="0" cy="0"/>
+        </a:xfrm>
+      </p:grpSpPr>
+      <p:sp>
+        <p:nvSpPr>
+          <p:cNvPr id="3" name="TextBox 2">
+            <a:extLst>
+              <a:ext uri="{FF2B5EF4-FFF2-40B4-BE49-F238E27FC236}">
+                <a16:creationId xmlns:a16="http://schemas.microsoft.com/office/drawing/2014/main" id="{3C072B20-143C-D178-75B3-4B6E66BEDF41}"/>
+              </a:ext>
+            </a:extLst>
+          </p:cNvPr>
+          <p:cNvSpPr txBox="1"/>
+          <p:nvPr/>
+        </p:nvSpPr>
+        <p:spPr>
+          <a:xfrm>
+            <a:off x="217714" y="255046"/>
             <a:ext cx="11756571" cy="355354"/>
           </a:xfrm>
           <a:prstGeom prst="rect">
@@ -3715,6 +5346,19 @@
               <a:buNone/>
             </a:pPr>
             <a:r>
+              <a:rPr kumimoji="0" lang="en-US" altLang="en-US" sz="1300" b="1" i="0" u="none" strike="noStrike" cap="none" normalizeH="0" baseline="0">
+                <a:ln>
+                  <a:noFill/>
+                </a:ln>
+                <a:solidFill>
+                  <a:srgbClr val="FF0000"/>
+                </a:solidFill>
+                <a:effectLst/>
+                <a:latin typeface="Arial" panose="020B0604020202020204" pitchFamily="34" charset="0"/>
+              </a:rPr>
+              <a:t>pluck('column') </a:t>
+            </a:r>
+            <a:r>
               <a:rPr kumimoji="0" lang="en-US" altLang="en-US" sz="1300" b="0" i="0" u="none" strike="noStrike" cap="none" normalizeH="0" baseline="0">
                 <a:ln>
                   <a:noFill/>
@@ -3725,15 +5369,856 @@
                 <a:effectLst/>
                 <a:latin typeface="Arial" panose="020B0604020202020204" pitchFamily="34" charset="0"/>
               </a:rPr>
-              <a:t>.</a:t>
-            </a:r>
-          </a:p>
-        </p:txBody>
-      </p:sp>
+              <a:t>- Yalnız bir sütunun dəyərlərini alır (array kimi)</a:t>
+            </a:r>
+            <a:r>
+              <a:rPr kumimoji="0" lang="az-Latn-AZ" altLang="en-US" sz="1300" b="0" i="0" u="none" strike="noStrike" cap="none" normalizeH="0" baseline="0">
+                <a:ln>
+                  <a:noFill/>
+                </a:ln>
+                <a:solidFill>
+                  <a:schemeClr val="tx1"/>
+                </a:solidFill>
+                <a:effectLst/>
+                <a:latin typeface="Arial" panose="020B0604020202020204" pitchFamily="34" charset="0"/>
+              </a:rPr>
+              <a:t>:           </a:t>
+            </a:r>
+            <a:r>
+              <a:rPr kumimoji="0" lang="en-US" altLang="en-US" sz="1300" b="1" i="0" u="none" strike="noStrike" cap="none" normalizeH="0" baseline="0">
+                <a:ln>
+                  <a:noFill/>
+                </a:ln>
+                <a:solidFill>
+                  <a:srgbClr val="FF0000"/>
+                </a:solidFill>
+                <a:effectLst/>
+                <a:latin typeface="Arial" panose="020B0604020202020204" pitchFamily="34" charset="0"/>
+              </a:rPr>
+              <a:t>$titles = DB::table('posts')-&gt;pluck('title');</a:t>
+            </a:r>
+          </a:p>
+        </p:txBody>
+      </p:sp>
+      <p:pic>
+        <p:nvPicPr>
+          <p:cNvPr id="4" name="Picture 3">
+            <a:extLst>
+              <a:ext uri="{FF2B5EF4-FFF2-40B4-BE49-F238E27FC236}">
+                <a16:creationId xmlns:a16="http://schemas.microsoft.com/office/drawing/2014/main" id="{07B3187B-14AC-F678-1E6E-F72B7DD1F075}"/>
+              </a:ext>
+            </a:extLst>
+          </p:cNvPr>
+          <p:cNvPicPr>
+            <a:picLocks noChangeAspect="1"/>
+          </p:cNvPicPr>
+          <p:nvPr/>
+        </p:nvPicPr>
+        <p:blipFill>
+          <a:blip r:embed="rId2"/>
+          <a:stretch>
+            <a:fillRect/>
+          </a:stretch>
+        </p:blipFill>
+        <p:spPr>
+          <a:xfrm>
+            <a:off x="293483" y="918087"/>
+            <a:ext cx="4572638" cy="647790"/>
+          </a:xfrm>
+          <a:prstGeom prst="rect">
+            <a:avLst/>
+          </a:prstGeom>
+        </p:spPr>
+      </p:pic>
+      <p:pic>
+        <p:nvPicPr>
+          <p:cNvPr id="6" name="Picture 5">
+            <a:extLst>
+              <a:ext uri="{FF2B5EF4-FFF2-40B4-BE49-F238E27FC236}">
+                <a16:creationId xmlns:a16="http://schemas.microsoft.com/office/drawing/2014/main" id="{D27D181B-657B-E55D-0C0E-EE51D445AE6E}"/>
+              </a:ext>
+            </a:extLst>
+          </p:cNvPr>
+          <p:cNvPicPr>
+            <a:picLocks noChangeAspect="1"/>
+          </p:cNvPicPr>
+          <p:nvPr/>
+        </p:nvPicPr>
+        <p:blipFill>
+          <a:blip r:embed="rId3"/>
+          <a:stretch>
+            <a:fillRect/>
+          </a:stretch>
+        </p:blipFill>
+        <p:spPr>
+          <a:xfrm>
+            <a:off x="5222448" y="2265481"/>
+            <a:ext cx="6969551" cy="4592519"/>
+          </a:xfrm>
+          <a:prstGeom prst="rect">
+            <a:avLst/>
+          </a:prstGeom>
+        </p:spPr>
+      </p:pic>
     </p:spTree>
     <p:extLst>
       <p:ext uri="{BB962C8B-B14F-4D97-AF65-F5344CB8AC3E}">
-        <p14:creationId xmlns:p14="http://schemas.microsoft.com/office/powerpoint/2010/main" val="3095838342"/>
+        <p14:creationId xmlns:p14="http://schemas.microsoft.com/office/powerpoint/2010/main" val="282094884"/>
+      </p:ext>
+    </p:extLst>
+  </p:cSld>
+  <p:clrMapOvr>
+    <a:masterClrMapping/>
+  </p:clrMapOvr>
+</p:sld>
+</file>
+
+<file path=ppt/slides/slide7.xml><?xml version="1.0" encoding="utf-8"?>
+<p:sld xmlns:a="http://schemas.openxmlformats.org/drawingml/2006/main" xmlns:r="http://schemas.openxmlformats.org/officeDocument/2006/relationships" xmlns:p="http://schemas.openxmlformats.org/presentationml/2006/main">
+  <p:cSld>
+    <p:spTree>
+      <p:nvGrpSpPr>
+        <p:cNvPr id="1" name="">
+          <a:extLst>
+            <a:ext uri="{FF2B5EF4-FFF2-40B4-BE49-F238E27FC236}">
+              <a16:creationId xmlns:a16="http://schemas.microsoft.com/office/drawing/2014/main" id="{748863FE-DD15-016A-C042-5A8E41FD04BF}"/>
+            </a:ext>
+          </a:extLst>
+        </p:cNvPr>
+        <p:cNvGrpSpPr/>
+        <p:nvPr/>
+      </p:nvGrpSpPr>
+      <p:grpSpPr>
+        <a:xfrm>
+          <a:off x="0" y="0"/>
+          <a:ext cx="0" cy="0"/>
+          <a:chOff x="0" y="0"/>
+          <a:chExt cx="0" cy="0"/>
+        </a:xfrm>
+      </p:grpSpPr>
+      <p:sp>
+        <p:nvSpPr>
+          <p:cNvPr id="3" name="TextBox 2">
+            <a:extLst>
+              <a:ext uri="{FF2B5EF4-FFF2-40B4-BE49-F238E27FC236}">
+                <a16:creationId xmlns:a16="http://schemas.microsoft.com/office/drawing/2014/main" id="{D1399FB7-35C7-BF35-C31C-209354C90B69}"/>
+              </a:ext>
+            </a:extLst>
+          </p:cNvPr>
+          <p:cNvSpPr txBox="1"/>
+          <p:nvPr/>
+        </p:nvSpPr>
+        <p:spPr>
+          <a:xfrm>
+            <a:off x="217714" y="255046"/>
+            <a:ext cx="11756571" cy="355354"/>
+          </a:xfrm>
+          <a:prstGeom prst="rect">
+            <a:avLst/>
+          </a:prstGeom>
+          <a:noFill/>
+        </p:spPr>
+        <p:txBody>
+          <a:bodyPr wrap="square">
+            <a:spAutoFit/>
+          </a:bodyPr>
+          <a:lstStyle/>
+          <a:p>
+            <a:pPr>
+              <a:lnSpc>
+                <a:spcPct val="150000"/>
+              </a:lnSpc>
+              <a:buNone/>
+            </a:pPr>
+            <a:r>
+              <a:rPr kumimoji="0" lang="en-US" altLang="en-US" sz="1300" b="1" i="0" u="none" strike="noStrike" cap="none" normalizeH="0" baseline="0">
+                <a:ln>
+                  <a:noFill/>
+                </a:ln>
+                <a:solidFill>
+                  <a:srgbClr val="FF0000"/>
+                </a:solidFill>
+                <a:effectLst/>
+                <a:latin typeface="Arial" panose="020B0604020202020204" pitchFamily="34" charset="0"/>
+              </a:rPr>
+              <a:t>value('column') </a:t>
+            </a:r>
+            <a:r>
+              <a:rPr kumimoji="0" lang="en-US" altLang="en-US" sz="1300" b="0" i="0" u="none" strike="noStrike" cap="none" normalizeH="0" baseline="0">
+                <a:ln>
+                  <a:noFill/>
+                </a:ln>
+                <a:solidFill>
+                  <a:schemeClr val="tx1"/>
+                </a:solidFill>
+                <a:effectLst/>
+                <a:latin typeface="Arial" panose="020B0604020202020204" pitchFamily="34" charset="0"/>
+              </a:rPr>
+              <a:t>- Bir sətirdə yalnız bir sütunun dəyərini qaytarır</a:t>
+            </a:r>
+            <a:r>
+              <a:rPr kumimoji="0" lang="az-Latn-AZ" altLang="en-US" sz="1300" b="0" i="0" u="none" strike="noStrike" cap="none" normalizeH="0" baseline="0">
+                <a:ln>
+                  <a:noFill/>
+                </a:ln>
+                <a:solidFill>
+                  <a:schemeClr val="tx1"/>
+                </a:solidFill>
+                <a:effectLst/>
+                <a:latin typeface="Arial" panose="020B0604020202020204" pitchFamily="34" charset="0"/>
+              </a:rPr>
+              <a:t>:                      </a:t>
+            </a:r>
+            <a:r>
+              <a:rPr kumimoji="0" lang="en-US" altLang="en-US" sz="1300" b="1" i="0" u="none" strike="noStrike" cap="none" normalizeH="0" baseline="0">
+                <a:ln>
+                  <a:noFill/>
+                </a:ln>
+                <a:solidFill>
+                  <a:srgbClr val="FF0000"/>
+                </a:solidFill>
+                <a:effectLst/>
+                <a:latin typeface="Arial" panose="020B0604020202020204" pitchFamily="34" charset="0"/>
+              </a:rPr>
+              <a:t>$title = DB::table('posts')-&gt;where('id', 1)-&gt;value('title');</a:t>
+            </a:r>
+          </a:p>
+        </p:txBody>
+      </p:sp>
+      <p:pic>
+        <p:nvPicPr>
+          <p:cNvPr id="4" name="Picture 3">
+            <a:extLst>
+              <a:ext uri="{FF2B5EF4-FFF2-40B4-BE49-F238E27FC236}">
+                <a16:creationId xmlns:a16="http://schemas.microsoft.com/office/drawing/2014/main" id="{414F69E4-C55E-EDA4-532B-9E2191C28F8A}"/>
+              </a:ext>
+            </a:extLst>
+          </p:cNvPr>
+          <p:cNvPicPr>
+            <a:picLocks noChangeAspect="1"/>
+          </p:cNvPicPr>
+          <p:nvPr/>
+        </p:nvPicPr>
+        <p:blipFill>
+          <a:blip r:embed="rId2"/>
+          <a:stretch>
+            <a:fillRect/>
+          </a:stretch>
+        </p:blipFill>
+        <p:spPr>
+          <a:xfrm>
+            <a:off x="217714" y="965618"/>
+            <a:ext cx="6011114" cy="571580"/>
+          </a:xfrm>
+          <a:prstGeom prst="rect">
+            <a:avLst/>
+          </a:prstGeom>
+        </p:spPr>
+      </p:pic>
+      <p:pic>
+        <p:nvPicPr>
+          <p:cNvPr id="6" name="Picture 5">
+            <a:extLst>
+              <a:ext uri="{FF2B5EF4-FFF2-40B4-BE49-F238E27FC236}">
+                <a16:creationId xmlns:a16="http://schemas.microsoft.com/office/drawing/2014/main" id="{8D745778-C75A-EC4A-930B-481758512261}"/>
+              </a:ext>
+            </a:extLst>
+          </p:cNvPr>
+          <p:cNvPicPr>
+            <a:picLocks noChangeAspect="1"/>
+          </p:cNvPicPr>
+          <p:nvPr/>
+        </p:nvPicPr>
+        <p:blipFill>
+          <a:blip r:embed="rId3"/>
+          <a:stretch>
+            <a:fillRect/>
+          </a:stretch>
+        </p:blipFill>
+        <p:spPr>
+          <a:xfrm>
+            <a:off x="7969091" y="5163110"/>
+            <a:ext cx="4153480" cy="1619476"/>
+          </a:xfrm>
+          <a:prstGeom prst="rect">
+            <a:avLst/>
+          </a:prstGeom>
+          <a:ln w="38100" cap="sq">
+            <a:solidFill>
+              <a:srgbClr val="000000"/>
+            </a:solidFill>
+            <a:prstDash val="solid"/>
+            <a:miter lim="800000"/>
+          </a:ln>
+          <a:effectLst>
+            <a:outerShdw blurRad="50800" dist="38100" dir="2700000" algn="tl" rotWithShape="0">
+              <a:srgbClr val="000000">
+                <a:alpha val="43000"/>
+              </a:srgbClr>
+            </a:outerShdw>
+          </a:effectLst>
+        </p:spPr>
+      </p:pic>
+    </p:spTree>
+    <p:extLst>
+      <p:ext uri="{BB962C8B-B14F-4D97-AF65-F5344CB8AC3E}">
+        <p14:creationId xmlns:p14="http://schemas.microsoft.com/office/powerpoint/2010/main" val="2763209509"/>
+      </p:ext>
+    </p:extLst>
+  </p:cSld>
+  <p:clrMapOvr>
+    <a:masterClrMapping/>
+  </p:clrMapOvr>
+</p:sld>
+</file>
+
+<file path=ppt/slides/slide8.xml><?xml version="1.0" encoding="utf-8"?>
+<p:sld xmlns:a="http://schemas.openxmlformats.org/drawingml/2006/main" xmlns:r="http://schemas.openxmlformats.org/officeDocument/2006/relationships" xmlns:p="http://schemas.openxmlformats.org/presentationml/2006/main">
+  <p:cSld>
+    <p:spTree>
+      <p:nvGrpSpPr>
+        <p:cNvPr id="1" name="">
+          <a:extLst>
+            <a:ext uri="{FF2B5EF4-FFF2-40B4-BE49-F238E27FC236}">
+              <a16:creationId xmlns:a16="http://schemas.microsoft.com/office/drawing/2014/main" id="{10EF11B8-3D34-4E4A-CBAF-437272BAF649}"/>
+            </a:ext>
+          </a:extLst>
+        </p:cNvPr>
+        <p:cNvGrpSpPr/>
+        <p:nvPr/>
+      </p:nvGrpSpPr>
+      <p:grpSpPr>
+        <a:xfrm>
+          <a:off x="0" y="0"/>
+          <a:ext cx="0" cy="0"/>
+          <a:chOff x="0" y="0"/>
+          <a:chExt cx="0" cy="0"/>
+        </a:xfrm>
+      </p:grpSpPr>
+      <p:sp>
+        <p:nvSpPr>
+          <p:cNvPr id="3" name="TextBox 2">
+            <a:extLst>
+              <a:ext uri="{FF2B5EF4-FFF2-40B4-BE49-F238E27FC236}">
+                <a16:creationId xmlns:a16="http://schemas.microsoft.com/office/drawing/2014/main" id="{505F59F7-CF19-32CC-CDAF-18835A111895}"/>
+              </a:ext>
+            </a:extLst>
+          </p:cNvPr>
+          <p:cNvSpPr txBox="1"/>
+          <p:nvPr/>
+        </p:nvSpPr>
+        <p:spPr>
+          <a:xfrm>
+            <a:off x="217714" y="255046"/>
+            <a:ext cx="11756571" cy="355354"/>
+          </a:xfrm>
+          <a:prstGeom prst="rect">
+            <a:avLst/>
+          </a:prstGeom>
+          <a:noFill/>
+        </p:spPr>
+        <p:txBody>
+          <a:bodyPr wrap="square">
+            <a:spAutoFit/>
+          </a:bodyPr>
+          <a:lstStyle/>
+          <a:p>
+            <a:pPr>
+              <a:lnSpc>
+                <a:spcPct val="150000"/>
+              </a:lnSpc>
+              <a:buNone/>
+            </a:pPr>
+            <a:r>
+              <a:rPr kumimoji="0" lang="en-US" altLang="en-US" sz="1300" b="1" i="0" u="none" strike="noStrike" cap="none" normalizeH="0" baseline="0">
+                <a:ln>
+                  <a:noFill/>
+                </a:ln>
+                <a:solidFill>
+                  <a:srgbClr val="FF0000"/>
+                </a:solidFill>
+                <a:effectLst/>
+                <a:latin typeface="Arial" panose="020B0604020202020204" pitchFamily="34" charset="0"/>
+              </a:rPr>
+              <a:t>where() </a:t>
+            </a:r>
+            <a:r>
+              <a:rPr kumimoji="0" lang="en-US" altLang="en-US" sz="1300" b="0" i="0" u="none" strike="noStrike" cap="none" normalizeH="0" baseline="0">
+                <a:ln>
+                  <a:noFill/>
+                </a:ln>
+                <a:solidFill>
+                  <a:schemeClr val="tx1"/>
+                </a:solidFill>
+                <a:effectLst/>
+                <a:latin typeface="Arial" panose="020B0604020202020204" pitchFamily="34" charset="0"/>
+              </a:rPr>
+              <a:t>- Şərt əlavə edir</a:t>
+            </a:r>
+            <a:r>
+              <a:rPr kumimoji="0" lang="az-Latn-AZ" altLang="en-US" sz="1300" b="0" i="0" u="none" strike="noStrike" cap="none" normalizeH="0" baseline="0">
+                <a:ln>
+                  <a:noFill/>
+                </a:ln>
+                <a:solidFill>
+                  <a:schemeClr val="tx1"/>
+                </a:solidFill>
+                <a:effectLst/>
+                <a:latin typeface="Arial" panose="020B0604020202020204" pitchFamily="34" charset="0"/>
+              </a:rPr>
+              <a:t>:                        </a:t>
+            </a:r>
+            <a:r>
+              <a:rPr kumimoji="0" lang="en-US" altLang="en-US" sz="1300" b="1" u="none" strike="noStrike" cap="none" normalizeH="0" baseline="0">
+                <a:ln>
+                  <a:noFill/>
+                </a:ln>
+                <a:solidFill>
+                  <a:srgbClr val="FF0000"/>
+                </a:solidFill>
+                <a:effectLst/>
+                <a:latin typeface="Arial" panose="020B0604020202020204" pitchFamily="34" charset="0"/>
+              </a:rPr>
+              <a:t>$activeUsers = DB::table('users')-&gt;where('status', 'active')-&gt;get();</a:t>
+            </a:r>
+          </a:p>
+        </p:txBody>
+      </p:sp>
+      <p:pic>
+        <p:nvPicPr>
+          <p:cNvPr id="4" name="Picture 3">
+            <a:extLst>
+              <a:ext uri="{FF2B5EF4-FFF2-40B4-BE49-F238E27FC236}">
+                <a16:creationId xmlns:a16="http://schemas.microsoft.com/office/drawing/2014/main" id="{4F3B0C58-E2B5-0901-33C3-DCDE92480C14}"/>
+              </a:ext>
+            </a:extLst>
+          </p:cNvPr>
+          <p:cNvPicPr>
+            <a:picLocks noChangeAspect="1"/>
+          </p:cNvPicPr>
+          <p:nvPr/>
+        </p:nvPicPr>
+        <p:blipFill>
+          <a:blip r:embed="rId2"/>
+          <a:stretch>
+            <a:fillRect/>
+          </a:stretch>
+        </p:blipFill>
+        <p:spPr>
+          <a:xfrm>
+            <a:off x="217714" y="884844"/>
+            <a:ext cx="7163800" cy="695422"/>
+          </a:xfrm>
+          <a:prstGeom prst="rect">
+            <a:avLst/>
+          </a:prstGeom>
+        </p:spPr>
+      </p:pic>
+    </p:spTree>
+    <p:extLst>
+      <p:ext uri="{BB962C8B-B14F-4D97-AF65-F5344CB8AC3E}">
+        <p14:creationId xmlns:p14="http://schemas.microsoft.com/office/powerpoint/2010/main" val="2711744283"/>
+      </p:ext>
+    </p:extLst>
+  </p:cSld>
+  <p:clrMapOvr>
+    <a:masterClrMapping/>
+  </p:clrMapOvr>
+</p:sld>
+</file>
+
+<file path=ppt/slides/slide9.xml><?xml version="1.0" encoding="utf-8"?>
+<p:sld xmlns:a="http://schemas.openxmlformats.org/drawingml/2006/main" xmlns:r="http://schemas.openxmlformats.org/officeDocument/2006/relationships" xmlns:p="http://schemas.openxmlformats.org/presentationml/2006/main">
+  <p:cSld>
+    <p:spTree>
+      <p:nvGrpSpPr>
+        <p:cNvPr id="1" name="">
+          <a:extLst>
+            <a:ext uri="{FF2B5EF4-FFF2-40B4-BE49-F238E27FC236}">
+              <a16:creationId xmlns:a16="http://schemas.microsoft.com/office/drawing/2014/main" id="{C765D19B-AD3D-B2A1-1869-EFE1F6633A24}"/>
+            </a:ext>
+          </a:extLst>
+        </p:cNvPr>
+        <p:cNvGrpSpPr/>
+        <p:nvPr/>
+      </p:nvGrpSpPr>
+      <p:grpSpPr>
+        <a:xfrm>
+          <a:off x="0" y="0"/>
+          <a:ext cx="0" cy="0"/>
+          <a:chOff x="0" y="0"/>
+          <a:chExt cx="0" cy="0"/>
+        </a:xfrm>
+      </p:grpSpPr>
+      <p:sp>
+        <p:nvSpPr>
+          <p:cNvPr id="3" name="TextBox 2">
+            <a:extLst>
+              <a:ext uri="{FF2B5EF4-FFF2-40B4-BE49-F238E27FC236}">
+                <a16:creationId xmlns:a16="http://schemas.microsoft.com/office/drawing/2014/main" id="{0E91F85F-C934-B839-71B1-34664727FC61}"/>
+              </a:ext>
+            </a:extLst>
+          </p:cNvPr>
+          <p:cNvSpPr txBox="1"/>
+          <p:nvPr/>
+        </p:nvSpPr>
+        <p:spPr>
+          <a:xfrm>
+            <a:off x="217714" y="255046"/>
+            <a:ext cx="11756571" cy="2756011"/>
+          </a:xfrm>
+          <a:prstGeom prst="rect">
+            <a:avLst/>
+          </a:prstGeom>
+          <a:noFill/>
+        </p:spPr>
+        <p:txBody>
+          <a:bodyPr wrap="square">
+            <a:spAutoFit/>
+          </a:bodyPr>
+          <a:lstStyle/>
+          <a:p>
+            <a:pPr>
+              <a:lnSpc>
+                <a:spcPct val="150000"/>
+              </a:lnSpc>
+              <a:buNone/>
+            </a:pPr>
+            <a:r>
+              <a:rPr kumimoji="0" lang="en-US" altLang="en-US" sz="1300" b="1" i="0" u="none" strike="noStrike" cap="none" normalizeH="0" baseline="0">
+                <a:ln>
+                  <a:noFill/>
+                </a:ln>
+                <a:solidFill>
+                  <a:srgbClr val="FF0000"/>
+                </a:solidFill>
+                <a:effectLst/>
+                <a:latin typeface="Arial" panose="020B0604020202020204" pitchFamily="34" charset="0"/>
+              </a:rPr>
+              <a:t>count(), max(), min(), avg(), sum()</a:t>
+            </a:r>
+          </a:p>
+          <a:p>
+            <a:pPr>
+              <a:lnSpc>
+                <a:spcPct val="150000"/>
+              </a:lnSpc>
+              <a:buNone/>
+            </a:pPr>
+            <a:r>
+              <a:rPr kumimoji="0" lang="en-US" altLang="en-US" sz="1300" b="1" i="0" u="none" strike="noStrike" cap="none" normalizeH="0" baseline="0">
+                <a:ln>
+                  <a:noFill/>
+                </a:ln>
+                <a:solidFill>
+                  <a:schemeClr val="tx1"/>
+                </a:solidFill>
+                <a:effectLst/>
+                <a:latin typeface="Arial" panose="020B0604020202020204" pitchFamily="34" charset="0"/>
+              </a:rPr>
+              <a:t>Aggregat funksiyalar</a:t>
+            </a:r>
+            <a:r>
+              <a:rPr kumimoji="0" lang="en-US" altLang="en-US" sz="1300" b="0" i="0" u="none" strike="noStrike" cap="none" normalizeH="0" baseline="0">
+                <a:ln>
+                  <a:noFill/>
+                </a:ln>
+                <a:solidFill>
+                  <a:schemeClr val="tx1"/>
+                </a:solidFill>
+                <a:effectLst/>
+                <a:latin typeface="Arial" panose="020B0604020202020204" pitchFamily="34" charset="0"/>
+              </a:rPr>
+              <a:t>:</a:t>
+            </a:r>
+          </a:p>
+          <a:p>
+            <a:pPr>
+              <a:lnSpc>
+                <a:spcPct val="150000"/>
+              </a:lnSpc>
+              <a:buNone/>
+            </a:pPr>
+            <a:r>
+              <a:rPr kumimoji="0" lang="en-US" altLang="en-US" sz="1300" b="0" i="0" u="none" strike="noStrike" cap="none" normalizeH="0" baseline="0">
+                <a:ln>
+                  <a:noFill/>
+                </a:ln>
+                <a:solidFill>
+                  <a:schemeClr val="tx1"/>
+                </a:solidFill>
+                <a:effectLst/>
+                <a:latin typeface="Arial" panose="020B0604020202020204" pitchFamily="34" charset="0"/>
+              </a:rPr>
+              <a:t>- `</a:t>
+            </a:r>
+            <a:r>
+              <a:rPr kumimoji="0" lang="en-US" altLang="en-US" sz="1300" b="1" i="0" u="none" strike="noStrike" cap="none" normalizeH="0" baseline="0">
+                <a:ln>
+                  <a:noFill/>
+                </a:ln>
+                <a:solidFill>
+                  <a:srgbClr val="00B050"/>
+                </a:solidFill>
+                <a:effectLst/>
+                <a:latin typeface="Arial" panose="020B0604020202020204" pitchFamily="34" charset="0"/>
+              </a:rPr>
+              <a:t>count()</a:t>
+            </a:r>
+            <a:r>
+              <a:rPr kumimoji="0" lang="en-US" altLang="en-US" sz="1300" b="0" i="0" u="none" strike="noStrike" cap="none" normalizeH="0" baseline="0">
+                <a:ln>
+                  <a:noFill/>
+                </a:ln>
+                <a:solidFill>
+                  <a:schemeClr val="tx1"/>
+                </a:solidFill>
+                <a:effectLst/>
+                <a:latin typeface="Arial" panose="020B0604020202020204" pitchFamily="34" charset="0"/>
+              </a:rPr>
+              <a:t>`: Qeydlərin sayını qaytarır.</a:t>
+            </a:r>
+          </a:p>
+          <a:p>
+            <a:pPr>
+              <a:lnSpc>
+                <a:spcPct val="150000"/>
+              </a:lnSpc>
+              <a:buNone/>
+            </a:pPr>
+            <a:r>
+              <a:rPr kumimoji="0" lang="en-US" altLang="en-US" sz="1300" b="0" i="0" u="none" strike="noStrike" cap="none" normalizeH="0" baseline="0">
+                <a:ln>
+                  <a:noFill/>
+                </a:ln>
+                <a:solidFill>
+                  <a:schemeClr val="tx1"/>
+                </a:solidFill>
+                <a:effectLst/>
+                <a:latin typeface="Arial" panose="020B0604020202020204" pitchFamily="34" charset="0"/>
+              </a:rPr>
+              <a:t>- `</a:t>
+            </a:r>
+            <a:r>
+              <a:rPr kumimoji="0" lang="en-US" altLang="en-US" sz="1300" b="1" i="0" u="none" strike="noStrike" cap="none" normalizeH="0" baseline="0">
+                <a:ln>
+                  <a:noFill/>
+                </a:ln>
+                <a:solidFill>
+                  <a:srgbClr val="00B050"/>
+                </a:solidFill>
+                <a:effectLst/>
+                <a:latin typeface="Arial" panose="020B0604020202020204" pitchFamily="34" charset="0"/>
+              </a:rPr>
+              <a:t>max()</a:t>
+            </a:r>
+            <a:r>
+              <a:rPr kumimoji="0" lang="en-US" altLang="en-US" sz="1300" b="0" i="0" u="none" strike="noStrike" cap="none" normalizeH="0" baseline="0">
+                <a:ln>
+                  <a:noFill/>
+                </a:ln>
+                <a:solidFill>
+                  <a:schemeClr val="tx1"/>
+                </a:solidFill>
+                <a:effectLst/>
+                <a:latin typeface="Arial" panose="020B0604020202020204" pitchFamily="34" charset="0"/>
+              </a:rPr>
+              <a:t>`: Sütunun maksimum dəyərini qaytarır.</a:t>
+            </a:r>
+          </a:p>
+          <a:p>
+            <a:pPr>
+              <a:lnSpc>
+                <a:spcPct val="150000"/>
+              </a:lnSpc>
+              <a:buNone/>
+            </a:pPr>
+            <a:r>
+              <a:rPr kumimoji="0" lang="en-US" altLang="en-US" sz="1300" b="0" i="0" u="none" strike="noStrike" cap="none" normalizeH="0" baseline="0">
+                <a:ln>
+                  <a:noFill/>
+                </a:ln>
+                <a:solidFill>
+                  <a:schemeClr val="tx1"/>
+                </a:solidFill>
+                <a:effectLst/>
+                <a:latin typeface="Arial" panose="020B0604020202020204" pitchFamily="34" charset="0"/>
+              </a:rPr>
+              <a:t>- `</a:t>
+            </a:r>
+            <a:r>
+              <a:rPr kumimoji="0" lang="en-US" altLang="en-US" sz="1300" b="1" i="0" u="none" strike="noStrike" cap="none" normalizeH="0" baseline="0">
+                <a:ln>
+                  <a:noFill/>
+                </a:ln>
+                <a:solidFill>
+                  <a:srgbClr val="00B050"/>
+                </a:solidFill>
+                <a:effectLst/>
+                <a:latin typeface="Arial" panose="020B0604020202020204" pitchFamily="34" charset="0"/>
+              </a:rPr>
+              <a:t>min()</a:t>
+            </a:r>
+            <a:r>
+              <a:rPr kumimoji="0" lang="en-US" altLang="en-US" sz="1300" b="0" i="0" u="none" strike="noStrike" cap="none" normalizeH="0" baseline="0">
+                <a:ln>
+                  <a:noFill/>
+                </a:ln>
+                <a:solidFill>
+                  <a:schemeClr val="tx1"/>
+                </a:solidFill>
+                <a:effectLst/>
+                <a:latin typeface="Arial" panose="020B0604020202020204" pitchFamily="34" charset="0"/>
+              </a:rPr>
+              <a:t>`: Sütunun minimum dəyərini qaytarır.</a:t>
+            </a:r>
+          </a:p>
+          <a:p>
+            <a:pPr>
+              <a:lnSpc>
+                <a:spcPct val="150000"/>
+              </a:lnSpc>
+              <a:buNone/>
+            </a:pPr>
+            <a:r>
+              <a:rPr kumimoji="0" lang="en-US" altLang="en-US" sz="1300" b="0" i="0" u="none" strike="noStrike" cap="none" normalizeH="0" baseline="0">
+                <a:ln>
+                  <a:noFill/>
+                </a:ln>
+                <a:solidFill>
+                  <a:schemeClr val="tx1"/>
+                </a:solidFill>
+                <a:effectLst/>
+                <a:latin typeface="Arial" panose="020B0604020202020204" pitchFamily="34" charset="0"/>
+              </a:rPr>
+              <a:t>- `</a:t>
+            </a:r>
+            <a:r>
+              <a:rPr kumimoji="0" lang="en-US" altLang="en-US" sz="1300" b="1" i="0" u="none" strike="noStrike" cap="none" normalizeH="0" baseline="0">
+                <a:ln>
+                  <a:noFill/>
+                </a:ln>
+                <a:solidFill>
+                  <a:srgbClr val="00B050"/>
+                </a:solidFill>
+                <a:effectLst/>
+                <a:latin typeface="Arial" panose="020B0604020202020204" pitchFamily="34" charset="0"/>
+              </a:rPr>
+              <a:t>avg()</a:t>
+            </a:r>
+            <a:r>
+              <a:rPr kumimoji="0" lang="en-US" altLang="en-US" sz="1300" b="0" i="0" u="none" strike="noStrike" cap="none" normalizeH="0" baseline="0">
+                <a:ln>
+                  <a:noFill/>
+                </a:ln>
+                <a:solidFill>
+                  <a:schemeClr val="tx1"/>
+                </a:solidFill>
+                <a:effectLst/>
+                <a:latin typeface="Arial" panose="020B0604020202020204" pitchFamily="34" charset="0"/>
+              </a:rPr>
+              <a:t>`: Sütunun orta</a:t>
+            </a:r>
+            <a:endParaRPr lang="az-Latn-AZ" altLang="en-US" sz="1300">
+              <a:latin typeface="Arial" panose="020B0604020202020204" pitchFamily="34" charset="0"/>
+            </a:endParaRPr>
+          </a:p>
+          <a:p>
+            <a:pPr>
+              <a:lnSpc>
+                <a:spcPct val="150000"/>
+              </a:lnSpc>
+              <a:buNone/>
+            </a:pPr>
+            <a:endParaRPr kumimoji="0" lang="az-Latn-AZ" altLang="en-US" sz="1300" b="0" i="0" u="none" strike="noStrike" cap="none" normalizeH="0" baseline="0">
+              <a:ln>
+                <a:noFill/>
+              </a:ln>
+              <a:solidFill>
+                <a:schemeClr val="tx1"/>
+              </a:solidFill>
+              <a:effectLst/>
+              <a:latin typeface="Arial" panose="020B0604020202020204" pitchFamily="34" charset="0"/>
+            </a:endParaRPr>
+          </a:p>
+          <a:p>
+            <a:pPr>
+              <a:lnSpc>
+                <a:spcPct val="150000"/>
+              </a:lnSpc>
+              <a:buNone/>
+            </a:pPr>
+            <a:r>
+              <a:rPr kumimoji="0" lang="en-US" altLang="en-US" sz="1300" b="1" i="0" u="none" strike="noStrike" cap="none" normalizeH="0" baseline="0">
+                <a:ln>
+                  <a:noFill/>
+                </a:ln>
+                <a:solidFill>
+                  <a:srgbClr val="FF0000"/>
+                </a:solidFill>
+                <a:effectLst/>
+                <a:latin typeface="Arial" panose="020B0604020202020204" pitchFamily="34" charset="0"/>
+              </a:rPr>
+              <a:t>$count = DB::table('users')-&gt;count();</a:t>
+            </a:r>
+          </a:p>
+          <a:p>
+            <a:pPr>
+              <a:lnSpc>
+                <a:spcPct val="150000"/>
+              </a:lnSpc>
+              <a:buNone/>
+            </a:pPr>
+            <a:r>
+              <a:rPr kumimoji="0" lang="en-US" altLang="en-US" sz="1300" b="1" i="0" u="none" strike="noStrike" cap="none" normalizeH="0" baseline="0">
+                <a:ln>
+                  <a:noFill/>
+                </a:ln>
+                <a:solidFill>
+                  <a:srgbClr val="FF0000"/>
+                </a:solidFill>
+                <a:effectLst/>
+                <a:latin typeface="Arial" panose="020B0604020202020204" pitchFamily="34" charset="0"/>
+              </a:rPr>
+              <a:t>$total = DB::table('orders')-&gt;sum('price');</a:t>
+            </a:r>
+          </a:p>
+        </p:txBody>
+      </p:sp>
+      <p:pic>
+        <p:nvPicPr>
+          <p:cNvPr id="4" name="Picture 3">
+            <a:extLst>
+              <a:ext uri="{FF2B5EF4-FFF2-40B4-BE49-F238E27FC236}">
+                <a16:creationId xmlns:a16="http://schemas.microsoft.com/office/drawing/2014/main" id="{D96D8095-0DEC-5243-59D5-D2AD6B14581E}"/>
+              </a:ext>
+            </a:extLst>
+          </p:cNvPr>
+          <p:cNvPicPr>
+            <a:picLocks noChangeAspect="1"/>
+          </p:cNvPicPr>
+          <p:nvPr/>
+        </p:nvPicPr>
+        <p:blipFill>
+          <a:blip r:embed="rId2"/>
+          <a:stretch>
+            <a:fillRect/>
+          </a:stretch>
+        </p:blipFill>
+        <p:spPr>
+          <a:xfrm>
+            <a:off x="217714" y="3244814"/>
+            <a:ext cx="5687219" cy="971686"/>
+          </a:xfrm>
+          <a:prstGeom prst="rect">
+            <a:avLst/>
+          </a:prstGeom>
+        </p:spPr>
+      </p:pic>
+    </p:spTree>
+    <p:extLst>
+      <p:ext uri="{BB962C8B-B14F-4D97-AF65-F5344CB8AC3E}">
+        <p14:creationId xmlns:p14="http://schemas.microsoft.com/office/powerpoint/2010/main" val="3390086564"/>
       </p:ext>
     </p:extLst>
   </p:cSld>

</xml_diff>

<commit_message>
Using Of Where Condition
</commit_message>
<xml_diff>
--- a/.lessons/16 Fundamental. Database - Query Builder/2 Retrieving Data From Database Table/1.pptx
+++ b/.lessons/16 Fundamental. Database - Query Builder/2 Retrieving Data From Database Table/1.pptx
@@ -16,6 +16,10 @@
     <p:sldId id="402" r:id="rId10"/>
     <p:sldId id="405" r:id="rId11"/>
     <p:sldId id="406" r:id="rId12"/>
+    <p:sldId id="407" r:id="rId13"/>
+    <p:sldId id="408" r:id="rId14"/>
+    <p:sldId id="409" r:id="rId15"/>
+    <p:sldId id="410" r:id="rId16"/>
   </p:sldIdLst>
   <p:sldSz cx="12192000" cy="6858000"/>
   <p:notesSz cx="6858000" cy="9144000"/>
@@ -4504,6 +4508,350 @@
     <p:extLst>
       <p:ext uri="{BB962C8B-B14F-4D97-AF65-F5344CB8AC3E}">
         <p14:creationId xmlns:p14="http://schemas.microsoft.com/office/powerpoint/2010/main" val="4079784358"/>
+      </p:ext>
+    </p:extLst>
+  </p:cSld>
+  <p:clrMapOvr>
+    <a:masterClrMapping/>
+  </p:clrMapOvr>
+</p:sld>
+</file>
+
+<file path=ppt/slides/slide12.xml><?xml version="1.0" encoding="utf-8"?>
+<p:sld xmlns:a="http://schemas.openxmlformats.org/drawingml/2006/main" xmlns:r="http://schemas.openxmlformats.org/officeDocument/2006/relationships" xmlns:p="http://schemas.openxmlformats.org/presentationml/2006/main">
+  <p:cSld>
+    <p:spTree>
+      <p:nvGrpSpPr>
+        <p:cNvPr id="1" name="">
+          <a:extLst>
+            <a:ext uri="{FF2B5EF4-FFF2-40B4-BE49-F238E27FC236}">
+              <a16:creationId xmlns:a16="http://schemas.microsoft.com/office/drawing/2014/main" id="{C758F14D-D392-607C-D839-E4624A5A763C}"/>
+            </a:ext>
+          </a:extLst>
+        </p:cNvPr>
+        <p:cNvGrpSpPr/>
+        <p:nvPr/>
+      </p:nvGrpSpPr>
+      <p:grpSpPr>
+        <a:xfrm>
+          <a:off x="0" y="0"/>
+          <a:ext cx="0" cy="0"/>
+          <a:chOff x="0" y="0"/>
+          <a:chExt cx="0" cy="0"/>
+        </a:xfrm>
+      </p:grpSpPr>
+      <p:sp>
+        <p:nvSpPr>
+          <p:cNvPr id="3" name="TextBox 2">
+            <a:extLst>
+              <a:ext uri="{FF2B5EF4-FFF2-40B4-BE49-F238E27FC236}">
+                <a16:creationId xmlns:a16="http://schemas.microsoft.com/office/drawing/2014/main" id="{66A765FC-0CF3-3616-ECC2-426B1AFCCD29}"/>
+              </a:ext>
+            </a:extLst>
+          </p:cNvPr>
+          <p:cNvSpPr txBox="1"/>
+          <p:nvPr/>
+        </p:nvSpPr>
+        <p:spPr>
+          <a:xfrm>
+            <a:off x="217714" y="255046"/>
+            <a:ext cx="11756571" cy="355354"/>
+          </a:xfrm>
+          <a:prstGeom prst="rect">
+            <a:avLst/>
+          </a:prstGeom>
+          <a:noFill/>
+        </p:spPr>
+        <p:txBody>
+          <a:bodyPr wrap="square">
+            <a:spAutoFit/>
+          </a:bodyPr>
+          <a:lstStyle/>
+          <a:p>
+            <a:pPr>
+              <a:lnSpc>
+                <a:spcPct val="150000"/>
+              </a:lnSpc>
+              <a:buNone/>
+            </a:pPr>
+            <a:r>
+              <a:rPr kumimoji="0" lang="en-US" altLang="en-US" sz="1300" b="0" i="0" u="none" strike="noStrike" cap="none" normalizeH="0" baseline="0">
+                <a:ln>
+                  <a:noFill/>
+                </a:ln>
+                <a:solidFill>
+                  <a:schemeClr val="tx1"/>
+                </a:solidFill>
+                <a:effectLst/>
+                <a:latin typeface="Arial" panose="020B0604020202020204" pitchFamily="34" charset="0"/>
+              </a:rPr>
+              <a:t>.</a:t>
+            </a:r>
+          </a:p>
+        </p:txBody>
+      </p:sp>
+    </p:spTree>
+    <p:extLst>
+      <p:ext uri="{BB962C8B-B14F-4D97-AF65-F5344CB8AC3E}">
+        <p14:creationId xmlns:p14="http://schemas.microsoft.com/office/powerpoint/2010/main" val="1612842181"/>
+      </p:ext>
+    </p:extLst>
+  </p:cSld>
+  <p:clrMapOvr>
+    <a:masterClrMapping/>
+  </p:clrMapOvr>
+</p:sld>
+</file>
+
+<file path=ppt/slides/slide13.xml><?xml version="1.0" encoding="utf-8"?>
+<p:sld xmlns:a="http://schemas.openxmlformats.org/drawingml/2006/main" xmlns:r="http://schemas.openxmlformats.org/officeDocument/2006/relationships" xmlns:p="http://schemas.openxmlformats.org/presentationml/2006/main">
+  <p:cSld>
+    <p:spTree>
+      <p:nvGrpSpPr>
+        <p:cNvPr id="1" name="">
+          <a:extLst>
+            <a:ext uri="{FF2B5EF4-FFF2-40B4-BE49-F238E27FC236}">
+              <a16:creationId xmlns:a16="http://schemas.microsoft.com/office/drawing/2014/main" id="{314E208B-3BA3-F347-0BCC-CE47B7BAB508}"/>
+            </a:ext>
+          </a:extLst>
+        </p:cNvPr>
+        <p:cNvGrpSpPr/>
+        <p:nvPr/>
+      </p:nvGrpSpPr>
+      <p:grpSpPr>
+        <a:xfrm>
+          <a:off x="0" y="0"/>
+          <a:ext cx="0" cy="0"/>
+          <a:chOff x="0" y="0"/>
+          <a:chExt cx="0" cy="0"/>
+        </a:xfrm>
+      </p:grpSpPr>
+      <p:sp>
+        <p:nvSpPr>
+          <p:cNvPr id="3" name="TextBox 2">
+            <a:extLst>
+              <a:ext uri="{FF2B5EF4-FFF2-40B4-BE49-F238E27FC236}">
+                <a16:creationId xmlns:a16="http://schemas.microsoft.com/office/drawing/2014/main" id="{B85C1271-E1ED-5D92-DBDF-ABFAA8D38ECF}"/>
+              </a:ext>
+            </a:extLst>
+          </p:cNvPr>
+          <p:cNvSpPr txBox="1"/>
+          <p:nvPr/>
+        </p:nvSpPr>
+        <p:spPr>
+          <a:xfrm>
+            <a:off x="217714" y="255046"/>
+            <a:ext cx="11756571" cy="355354"/>
+          </a:xfrm>
+          <a:prstGeom prst="rect">
+            <a:avLst/>
+          </a:prstGeom>
+          <a:noFill/>
+        </p:spPr>
+        <p:txBody>
+          <a:bodyPr wrap="square">
+            <a:spAutoFit/>
+          </a:bodyPr>
+          <a:lstStyle/>
+          <a:p>
+            <a:pPr>
+              <a:lnSpc>
+                <a:spcPct val="150000"/>
+              </a:lnSpc>
+              <a:buNone/>
+            </a:pPr>
+            <a:r>
+              <a:rPr kumimoji="0" lang="en-US" altLang="en-US" sz="1300" b="0" i="0" u="none" strike="noStrike" cap="none" normalizeH="0" baseline="0">
+                <a:ln>
+                  <a:noFill/>
+                </a:ln>
+                <a:solidFill>
+                  <a:schemeClr val="tx1"/>
+                </a:solidFill>
+                <a:effectLst/>
+                <a:latin typeface="Arial" panose="020B0604020202020204" pitchFamily="34" charset="0"/>
+              </a:rPr>
+              <a:t>.</a:t>
+            </a:r>
+          </a:p>
+        </p:txBody>
+      </p:sp>
+    </p:spTree>
+    <p:extLst>
+      <p:ext uri="{BB962C8B-B14F-4D97-AF65-F5344CB8AC3E}">
+        <p14:creationId xmlns:p14="http://schemas.microsoft.com/office/powerpoint/2010/main" val="2047226097"/>
+      </p:ext>
+    </p:extLst>
+  </p:cSld>
+  <p:clrMapOvr>
+    <a:masterClrMapping/>
+  </p:clrMapOvr>
+</p:sld>
+</file>
+
+<file path=ppt/slides/slide14.xml><?xml version="1.0" encoding="utf-8"?>
+<p:sld xmlns:a="http://schemas.openxmlformats.org/drawingml/2006/main" xmlns:r="http://schemas.openxmlformats.org/officeDocument/2006/relationships" xmlns:p="http://schemas.openxmlformats.org/presentationml/2006/main">
+  <p:cSld>
+    <p:spTree>
+      <p:nvGrpSpPr>
+        <p:cNvPr id="1" name="">
+          <a:extLst>
+            <a:ext uri="{FF2B5EF4-FFF2-40B4-BE49-F238E27FC236}">
+              <a16:creationId xmlns:a16="http://schemas.microsoft.com/office/drawing/2014/main" id="{3F0AAB6D-46CA-D554-99EF-EA85108DBADE}"/>
+            </a:ext>
+          </a:extLst>
+        </p:cNvPr>
+        <p:cNvGrpSpPr/>
+        <p:nvPr/>
+      </p:nvGrpSpPr>
+      <p:grpSpPr>
+        <a:xfrm>
+          <a:off x="0" y="0"/>
+          <a:ext cx="0" cy="0"/>
+          <a:chOff x="0" y="0"/>
+          <a:chExt cx="0" cy="0"/>
+        </a:xfrm>
+      </p:grpSpPr>
+      <p:sp>
+        <p:nvSpPr>
+          <p:cNvPr id="3" name="TextBox 2">
+            <a:extLst>
+              <a:ext uri="{FF2B5EF4-FFF2-40B4-BE49-F238E27FC236}">
+                <a16:creationId xmlns:a16="http://schemas.microsoft.com/office/drawing/2014/main" id="{8C401198-4573-E289-A34D-98B60075F3D1}"/>
+              </a:ext>
+            </a:extLst>
+          </p:cNvPr>
+          <p:cNvSpPr txBox="1"/>
+          <p:nvPr/>
+        </p:nvSpPr>
+        <p:spPr>
+          <a:xfrm>
+            <a:off x="217714" y="255046"/>
+            <a:ext cx="11756571" cy="355354"/>
+          </a:xfrm>
+          <a:prstGeom prst="rect">
+            <a:avLst/>
+          </a:prstGeom>
+          <a:noFill/>
+        </p:spPr>
+        <p:txBody>
+          <a:bodyPr wrap="square">
+            <a:spAutoFit/>
+          </a:bodyPr>
+          <a:lstStyle/>
+          <a:p>
+            <a:pPr>
+              <a:lnSpc>
+                <a:spcPct val="150000"/>
+              </a:lnSpc>
+              <a:buNone/>
+            </a:pPr>
+            <a:r>
+              <a:rPr kumimoji="0" lang="en-US" altLang="en-US" sz="1300" b="0" i="0" u="none" strike="noStrike" cap="none" normalizeH="0" baseline="0">
+                <a:ln>
+                  <a:noFill/>
+                </a:ln>
+                <a:solidFill>
+                  <a:schemeClr val="tx1"/>
+                </a:solidFill>
+                <a:effectLst/>
+                <a:latin typeface="Arial" panose="020B0604020202020204" pitchFamily="34" charset="0"/>
+              </a:rPr>
+              <a:t>.</a:t>
+            </a:r>
+          </a:p>
+        </p:txBody>
+      </p:sp>
+    </p:spTree>
+    <p:extLst>
+      <p:ext uri="{BB962C8B-B14F-4D97-AF65-F5344CB8AC3E}">
+        <p14:creationId xmlns:p14="http://schemas.microsoft.com/office/powerpoint/2010/main" val="1079146163"/>
+      </p:ext>
+    </p:extLst>
+  </p:cSld>
+  <p:clrMapOvr>
+    <a:masterClrMapping/>
+  </p:clrMapOvr>
+</p:sld>
+</file>
+
+<file path=ppt/slides/slide15.xml><?xml version="1.0" encoding="utf-8"?>
+<p:sld xmlns:a="http://schemas.openxmlformats.org/drawingml/2006/main" xmlns:r="http://schemas.openxmlformats.org/officeDocument/2006/relationships" xmlns:p="http://schemas.openxmlformats.org/presentationml/2006/main">
+  <p:cSld>
+    <p:spTree>
+      <p:nvGrpSpPr>
+        <p:cNvPr id="1" name="">
+          <a:extLst>
+            <a:ext uri="{FF2B5EF4-FFF2-40B4-BE49-F238E27FC236}">
+              <a16:creationId xmlns:a16="http://schemas.microsoft.com/office/drawing/2014/main" id="{E65F7FDE-0126-B613-3373-45BCAAF3DF90}"/>
+            </a:ext>
+          </a:extLst>
+        </p:cNvPr>
+        <p:cNvGrpSpPr/>
+        <p:nvPr/>
+      </p:nvGrpSpPr>
+      <p:grpSpPr>
+        <a:xfrm>
+          <a:off x="0" y="0"/>
+          <a:ext cx="0" cy="0"/>
+          <a:chOff x="0" y="0"/>
+          <a:chExt cx="0" cy="0"/>
+        </a:xfrm>
+      </p:grpSpPr>
+      <p:sp>
+        <p:nvSpPr>
+          <p:cNvPr id="3" name="TextBox 2">
+            <a:extLst>
+              <a:ext uri="{FF2B5EF4-FFF2-40B4-BE49-F238E27FC236}">
+                <a16:creationId xmlns:a16="http://schemas.microsoft.com/office/drawing/2014/main" id="{74A4036B-88E0-4D64-787F-F806D36C29DF}"/>
+              </a:ext>
+            </a:extLst>
+          </p:cNvPr>
+          <p:cNvSpPr txBox="1"/>
+          <p:nvPr/>
+        </p:nvSpPr>
+        <p:spPr>
+          <a:xfrm>
+            <a:off x="217714" y="255046"/>
+            <a:ext cx="11756571" cy="355354"/>
+          </a:xfrm>
+          <a:prstGeom prst="rect">
+            <a:avLst/>
+          </a:prstGeom>
+          <a:noFill/>
+        </p:spPr>
+        <p:txBody>
+          <a:bodyPr wrap="square">
+            <a:spAutoFit/>
+          </a:bodyPr>
+          <a:lstStyle/>
+          <a:p>
+            <a:pPr>
+              <a:lnSpc>
+                <a:spcPct val="150000"/>
+              </a:lnSpc>
+              <a:buNone/>
+            </a:pPr>
+            <a:r>
+              <a:rPr kumimoji="0" lang="en-US" altLang="en-US" sz="1300" b="0" i="0" u="none" strike="noStrike" cap="none" normalizeH="0" baseline="0">
+                <a:ln>
+                  <a:noFill/>
+                </a:ln>
+                <a:solidFill>
+                  <a:schemeClr val="tx1"/>
+                </a:solidFill>
+                <a:effectLst/>
+                <a:latin typeface="Arial" panose="020B0604020202020204" pitchFamily="34" charset="0"/>
+              </a:rPr>
+              <a:t>.</a:t>
+            </a:r>
+          </a:p>
+        </p:txBody>
+      </p:sp>
+    </p:spTree>
+    <p:extLst>
+      <p:ext uri="{BB962C8B-B14F-4D97-AF65-F5344CB8AC3E}">
+        <p14:creationId xmlns:p14="http://schemas.microsoft.com/office/powerpoint/2010/main" val="809661009"/>
       </p:ext>
     </p:extLst>
   </p:cSld>

</xml_diff>